<commit_message>
Began writing the hazard analysis documentation
</commit_message>
<xml_diff>
--- a/mdcf-architect-documentation/src/site/sphinx/_originals/app-overview.pptx
+++ b/mdcf-architect-documentation/src/site/sphinx/_originals/app-overview.pptx
@@ -6,6 +6,7 @@
   </p:sldMasterIdLst>
   <p:sldIdLst>
     <p:sldId id="256" r:id="rId2"/>
+    <p:sldId id="257" r:id="rId3"/>
   </p:sldIdLst>
   <p:sldSz cx="9144000" cy="6858000" type="screen4x3"/>
   <p:notesSz cx="7010400" cy="9296400"/>
@@ -3211,85 +3212,6 @@
       </p:grpSpPr>
       <p:sp>
         <p:nvSpPr>
-          <p:cNvPr id="2074" name="Line 26"/>
-          <p:cNvSpPr>
-            <a:spLocks noChangeShapeType="1"/>
-          </p:cNvSpPr>
-          <p:nvPr/>
-        </p:nvSpPr>
-        <p:spPr bwMode="auto">
-          <a:xfrm flipH="1">
-            <a:off x="3225799" y="6172200"/>
-            <a:ext cx="76199" cy="228600"/>
-          </a:xfrm>
-          <a:prstGeom prst="line">
-            <a:avLst/>
-          </a:prstGeom>
-          <a:noFill/>
-          <a:ln w="9525" cap="flat" cmpd="sng" algn="ctr">
-            <a:solidFill>
-              <a:schemeClr val="tx1"/>
-            </a:solidFill>
-            <a:prstDash val="sysDash"/>
-            <a:round/>
-            <a:headEnd type="none" w="med" len="med"/>
-            <a:tailEnd type="triangle" w="med" len="med"/>
-          </a:ln>
-          <a:effectLst/>
-        </p:spPr>
-        <p:txBody>
-          <a:bodyPr/>
-          <a:lstStyle/>
-          <a:p>
-            <a:endParaRPr lang="en-US"/>
-          </a:p>
-        </p:txBody>
-      </p:sp>
-      <p:sp>
-        <p:nvSpPr>
-          <p:cNvPr id="41" name="Rectangle 16"/>
-          <p:cNvSpPr>
-            <a:spLocks noChangeArrowheads="1"/>
-          </p:cNvSpPr>
-          <p:nvPr/>
-        </p:nvSpPr>
-        <p:spPr bwMode="auto">
-          <a:xfrm>
-            <a:off x="1752600" y="6400800"/>
-            <a:ext cx="2667000" cy="381000"/>
-          </a:xfrm>
-          <a:prstGeom prst="rect">
-            <a:avLst/>
-          </a:prstGeom>
-          <a:solidFill>
-            <a:srgbClr val="99CCFF">
-              <a:alpha val="63000"/>
-            </a:srgbClr>
-          </a:solidFill>
-          <a:ln w="9525">
-            <a:solidFill>
-              <a:schemeClr val="tx1"/>
-            </a:solidFill>
-            <a:miter lim="800000"/>
-            <a:headEnd/>
-            <a:tailEnd/>
-          </a:ln>
-          <a:effectLst/>
-        </p:spPr>
-        <p:txBody>
-          <a:bodyPr wrap="none" anchor="ctr"/>
-          <a:lstStyle/>
-          <a:p>
-            <a:pPr algn="ctr"/>
-            <a:r>
-              <a:rPr lang="en-US" dirty="0"/>
-              <a:t>Patient</a:t>
-            </a:r>
-          </a:p>
-        </p:txBody>
-      </p:sp>
-      <p:sp>
-        <p:nvSpPr>
           <p:cNvPr id="43" name="Text Box 23"/>
           <p:cNvSpPr txBox="1">
             <a:spLocks noChangeArrowheads="1"/>
@@ -3298,8 +3220,8 @@
         </p:nvSpPr>
         <p:spPr bwMode="auto">
           <a:xfrm>
-            <a:off x="762000" y="5486400"/>
-            <a:ext cx="2010295" cy="430887"/>
+            <a:off x="685800" y="5334000"/>
+            <a:ext cx="2467495" cy="430887"/>
           </a:xfrm>
           <a:prstGeom prst="rect">
             <a:avLst/>
@@ -3326,7 +3248,7 @@
             </a:pPr>
             <a:r>
               <a:rPr lang="en-US" sz="1100" dirty="0" smtClean="0"/>
-              <a:t>ICE Pulse </a:t>
+              <a:t>MDCF Compatible Pulse </a:t>
             </a:r>
             <a:r>
               <a:rPr lang="en-US" sz="1100" dirty="0" err="1" smtClean="0"/>
@@ -3338,45 +3260,974 @@
             </a:r>
             <a:r>
               <a:rPr lang="en-US" sz="1100" dirty="0" smtClean="0"/>
-              <a:t>interface </a:t>
+              <a:t>interface conformant </a:t>
             </a:r>
             <a:r>
               <a:rPr lang="en-US" sz="1100" dirty="0" smtClean="0"/>
-              <a:t>conformant devices</a:t>
-            </a:r>
-          </a:p>
-        </p:txBody>
-      </p:sp>
-      <p:cxnSp>
-        <p:nvCxnSpPr>
-          <p:cNvPr id="61" name="Straight Connector 60"/>
-          <p:cNvCxnSpPr/>
+              <a:t>device</a:t>
+            </a:r>
+            <a:endParaRPr lang="en-US" sz="1100" dirty="0" smtClean="0"/>
+          </a:p>
+        </p:txBody>
+      </p:sp>
+      <p:grpSp>
+        <p:nvGrpSpPr>
+          <p:cNvPr id="2" name="Group 1"/>
+          <p:cNvGrpSpPr/>
           <p:nvPr/>
-        </p:nvCxnSpPr>
-        <p:spPr bwMode="auto">
-          <a:xfrm flipV="1">
-            <a:off x="3148806" y="4572000"/>
-            <a:ext cx="0" cy="915194"/>
+        </p:nvGrpSpPr>
+        <p:grpSpPr>
+          <a:xfrm>
+            <a:off x="1752600" y="228600"/>
+            <a:ext cx="5638800" cy="6553201"/>
+            <a:chOff x="1752600" y="1468394"/>
+            <a:chExt cx="4572000" cy="5313406"/>
           </a:xfrm>
-          <a:prstGeom prst="line">
-            <a:avLst/>
-          </a:prstGeom>
-          <a:noFill/>
-          <a:ln w="9525" cap="flat" cmpd="sng" algn="ctr">
+        </p:grpSpPr>
+        <p:sp>
+          <p:nvSpPr>
+            <p:cNvPr id="2074" name="Line 26"/>
+            <p:cNvSpPr>
+              <a:spLocks noChangeShapeType="1"/>
+            </p:cNvSpPr>
+            <p:nvPr/>
+          </p:nvSpPr>
+          <p:spPr bwMode="auto">
+            <a:xfrm flipH="1">
+              <a:off x="3225799" y="6172200"/>
+              <a:ext cx="76199" cy="228600"/>
+            </a:xfrm>
+            <a:prstGeom prst="line">
+              <a:avLst/>
+            </a:prstGeom>
+            <a:noFill/>
+            <a:ln w="9525" cap="flat" cmpd="sng" algn="ctr">
+              <a:solidFill>
+                <a:schemeClr val="tx1"/>
+              </a:solidFill>
+              <a:prstDash val="sysDash"/>
+              <a:round/>
+              <a:headEnd type="none" w="med" len="med"/>
+              <a:tailEnd type="triangle" w="med" len="med"/>
+            </a:ln>
+            <a:effectLst/>
+          </p:spPr>
+          <p:txBody>
+            <a:bodyPr/>
+            <a:lstStyle/>
+            <a:p>
+              <a:endParaRPr lang="en-US"/>
+            </a:p>
+          </p:txBody>
+        </p:sp>
+        <p:sp>
+          <p:nvSpPr>
+            <p:cNvPr id="41" name="Rectangle 16"/>
+            <p:cNvSpPr>
+              <a:spLocks noChangeArrowheads="1"/>
+            </p:cNvSpPr>
+            <p:nvPr/>
+          </p:nvSpPr>
+          <p:spPr bwMode="auto">
+            <a:xfrm>
+              <a:off x="1752600" y="6400800"/>
+              <a:ext cx="2667000" cy="381000"/>
+            </a:xfrm>
+            <a:prstGeom prst="rect">
+              <a:avLst/>
+            </a:prstGeom>
             <a:solidFill>
-              <a:srgbClr val="3366FF"/>
+              <a:srgbClr val="99CCFF">
+                <a:alpha val="63000"/>
+              </a:srgbClr>
             </a:solidFill>
-            <a:prstDash val="solid"/>
-            <a:round/>
-            <a:headEnd type="none" w="med" len="med"/>
-            <a:tailEnd type="triangle" w="med" len="med"/>
-          </a:ln>
-          <a:effectLst/>
-        </p:spPr>
-      </p:cxnSp>
-      <p:sp>
-        <p:nvSpPr>
-          <p:cNvPr id="68" name="Text Box 23"/>
+            <a:ln w="9525">
+              <a:solidFill>
+                <a:schemeClr val="tx1"/>
+              </a:solidFill>
+              <a:miter lim="800000"/>
+              <a:headEnd/>
+              <a:tailEnd/>
+            </a:ln>
+            <a:effectLst/>
+          </p:spPr>
+          <p:txBody>
+            <a:bodyPr wrap="none" anchor="ctr"/>
+            <a:lstStyle/>
+            <a:p>
+              <a:pPr algn="ctr"/>
+              <a:r>
+                <a:rPr lang="en-US" dirty="0"/>
+                <a:t>Patient</a:t>
+              </a:r>
+            </a:p>
+          </p:txBody>
+        </p:sp>
+        <p:cxnSp>
+          <p:nvCxnSpPr>
+            <p:cNvPr id="61" name="Straight Connector 60"/>
+            <p:cNvCxnSpPr/>
+            <p:nvPr/>
+          </p:nvCxnSpPr>
+          <p:spPr bwMode="auto">
+            <a:xfrm flipV="1">
+              <a:off x="3148806" y="4572000"/>
+              <a:ext cx="0" cy="915194"/>
+            </a:xfrm>
+            <a:prstGeom prst="line">
+              <a:avLst/>
+            </a:prstGeom>
+            <a:noFill/>
+            <a:ln w="9525" cap="flat" cmpd="sng" algn="ctr">
+              <a:solidFill>
+                <a:srgbClr val="3366FF"/>
+              </a:solidFill>
+              <a:prstDash val="solid"/>
+              <a:round/>
+              <a:headEnd type="none" w="med" len="med"/>
+              <a:tailEnd type="triangle" w="med" len="med"/>
+            </a:ln>
+            <a:effectLst/>
+          </p:spPr>
+        </p:cxnSp>
+        <p:sp>
+          <p:nvSpPr>
+            <p:cNvPr id="68" name="Text Box 23"/>
+            <p:cNvSpPr txBox="1">
+              <a:spLocks noChangeArrowheads="1"/>
+            </p:cNvSpPr>
+            <p:nvPr/>
+          </p:nvSpPr>
+          <p:spPr bwMode="auto">
+            <a:xfrm>
+              <a:off x="3121429" y="4800600"/>
+              <a:ext cx="688571" cy="430887"/>
+            </a:xfrm>
+            <a:prstGeom prst="rect">
+              <a:avLst/>
+            </a:prstGeom>
+            <a:noFill/>
+            <a:ln w="9525">
+              <a:noFill/>
+              <a:miter lim="800000"/>
+              <a:headEnd/>
+              <a:tailEnd/>
+            </a:ln>
+            <a:effectLst/>
+          </p:spPr>
+          <p:txBody>
+            <a:bodyPr wrap="square">
+              <a:spAutoFit/>
+            </a:bodyPr>
+            <a:lstStyle/>
+            <a:p>
+              <a:pPr>
+                <a:spcBef>
+                  <a:spcPct val="50000"/>
+                </a:spcBef>
+              </a:pPr>
+              <a:r>
+                <a:rPr lang="en-US" sz="1100" dirty="0" smtClean="0"/>
+                <a:t>Sensor Data</a:t>
+              </a:r>
+            </a:p>
+          </p:txBody>
+        </p:sp>
+        <p:sp>
+          <p:nvSpPr>
+            <p:cNvPr id="79" name="Rectangle 78"/>
+            <p:cNvSpPr/>
+            <p:nvPr/>
+          </p:nvSpPr>
+          <p:spPr bwMode="auto">
+            <a:xfrm>
+              <a:off x="2209800" y="2667000"/>
+              <a:ext cx="2590800" cy="1905000"/>
+            </a:xfrm>
+            <a:prstGeom prst="rect">
+              <a:avLst/>
+            </a:prstGeom>
+            <a:noFill/>
+            <a:ln w="9525" cap="flat" cmpd="sng" algn="ctr">
+              <a:solidFill>
+                <a:schemeClr val="tx1"/>
+              </a:solidFill>
+              <a:prstDash val="solid"/>
+              <a:round/>
+              <a:headEnd type="none" w="med" len="med"/>
+              <a:tailEnd type="none" w="med" len="med"/>
+            </a:ln>
+            <a:effectLst/>
+          </p:spPr>
+          <p:txBody>
+            <a:bodyPr vert="horz" wrap="square" lIns="91440" tIns="45720" rIns="91440" bIns="45720" numCol="1" rtlCol="0" anchor="t" anchorCtr="0" compatLnSpc="1">
+              <a:prstTxWarp prst="textNoShape">
+                <a:avLst/>
+              </a:prstTxWarp>
+            </a:bodyPr>
+            <a:lstStyle/>
+            <a:p>
+              <a:pPr marL="0" marR="0" indent="0" algn="l" defTabSz="914400" rtl="0" eaLnBrk="1" fontAlgn="base" latinLnBrk="0" hangingPunct="1">
+                <a:lnSpc>
+                  <a:spcPct val="100000"/>
+                </a:lnSpc>
+                <a:spcBef>
+                  <a:spcPct val="0"/>
+                </a:spcBef>
+                <a:spcAft>
+                  <a:spcPct val="0"/>
+                </a:spcAft>
+                <a:buClrTx/>
+                <a:buSzTx/>
+                <a:buFontTx/>
+                <a:buNone/>
+                <a:tabLst/>
+              </a:pPr>
+              <a:endParaRPr kumimoji="0" lang="en-US" sz="1800" b="0" i="0" u="none" strike="noStrike" cap="none" normalizeH="0" baseline="0" smtClean="0">
+                <a:ln>
+                  <a:noFill/>
+                </a:ln>
+                <a:solidFill>
+                  <a:schemeClr val="tx1"/>
+                </a:solidFill>
+                <a:effectLst/>
+                <a:latin typeface="Arial" charset="0"/>
+              </a:endParaRPr>
+            </a:p>
+          </p:txBody>
+        </p:sp>
+        <p:sp>
+          <p:nvSpPr>
+            <p:cNvPr id="80" name="TextBox 79"/>
+            <p:cNvSpPr txBox="1"/>
+            <p:nvPr/>
+          </p:nvSpPr>
+          <p:spPr>
+            <a:xfrm>
+              <a:off x="2185086" y="2395151"/>
+              <a:ext cx="925429" cy="400110"/>
+            </a:xfrm>
+            <a:prstGeom prst="rect">
+              <a:avLst/>
+            </a:prstGeom>
+            <a:noFill/>
+          </p:spPr>
+          <p:txBody>
+            <a:bodyPr wrap="none" rtlCol="0">
+              <a:spAutoFit/>
+            </a:bodyPr>
+            <a:lstStyle/>
+            <a:p>
+              <a:r>
+                <a:rPr lang="en-US" sz="2000" dirty="0" smtClean="0"/>
+                <a:t>MDCF</a:t>
+              </a:r>
+              <a:endParaRPr lang="en-US" sz="2000" dirty="0"/>
+            </a:p>
+          </p:txBody>
+        </p:sp>
+        <p:sp>
+          <p:nvSpPr>
+            <p:cNvPr id="81" name="Rectangle 80"/>
+            <p:cNvSpPr/>
+            <p:nvPr/>
+          </p:nvSpPr>
+          <p:spPr bwMode="auto">
+            <a:xfrm>
+              <a:off x="2895600" y="3124200"/>
+              <a:ext cx="1676400" cy="1219200"/>
+            </a:xfrm>
+            <a:prstGeom prst="rect">
+              <a:avLst/>
+            </a:prstGeom>
+            <a:noFill/>
+            <a:ln w="9525" cap="flat" cmpd="sng" algn="ctr">
+              <a:solidFill>
+                <a:schemeClr val="tx1"/>
+              </a:solidFill>
+              <a:prstDash val="solid"/>
+              <a:round/>
+              <a:headEnd type="none" w="med" len="med"/>
+              <a:tailEnd type="none" w="med" len="med"/>
+            </a:ln>
+            <a:effectLst/>
+          </p:spPr>
+          <p:txBody>
+            <a:bodyPr vert="horz" wrap="square" lIns="91440" tIns="45720" rIns="91440" bIns="45720" numCol="1" rtlCol="0" anchor="t" anchorCtr="0" compatLnSpc="1">
+              <a:prstTxWarp prst="textNoShape">
+                <a:avLst/>
+              </a:prstTxWarp>
+            </a:bodyPr>
+            <a:lstStyle/>
+            <a:p>
+              <a:pPr marL="0" marR="0" indent="0" algn="l" defTabSz="914400" rtl="0" eaLnBrk="1" fontAlgn="base" latinLnBrk="0" hangingPunct="1">
+                <a:lnSpc>
+                  <a:spcPct val="100000"/>
+                </a:lnSpc>
+                <a:spcBef>
+                  <a:spcPct val="0"/>
+                </a:spcBef>
+                <a:spcAft>
+                  <a:spcPct val="0"/>
+                </a:spcAft>
+                <a:buClrTx/>
+                <a:buSzTx/>
+                <a:buFontTx/>
+                <a:buNone/>
+                <a:tabLst/>
+              </a:pPr>
+              <a:endParaRPr kumimoji="0" lang="en-US" sz="1800" b="0" i="0" u="none" strike="noStrike" cap="none" normalizeH="0" baseline="0" smtClean="0">
+                <a:ln>
+                  <a:noFill/>
+                </a:ln>
+                <a:solidFill>
+                  <a:schemeClr val="tx1"/>
+                </a:solidFill>
+                <a:effectLst/>
+                <a:latin typeface="Arial" charset="0"/>
+              </a:endParaRPr>
+            </a:p>
+          </p:txBody>
+        </p:sp>
+        <p:sp>
+          <p:nvSpPr>
+            <p:cNvPr id="82" name="TextBox 81"/>
+            <p:cNvSpPr txBox="1"/>
+            <p:nvPr/>
+          </p:nvSpPr>
+          <p:spPr>
+            <a:xfrm>
+              <a:off x="4038600" y="2827637"/>
+              <a:ext cx="653845" cy="400110"/>
+            </a:xfrm>
+            <a:prstGeom prst="rect">
+              <a:avLst/>
+            </a:prstGeom>
+            <a:noFill/>
+          </p:spPr>
+          <p:txBody>
+            <a:bodyPr wrap="none" rtlCol="0">
+              <a:spAutoFit/>
+            </a:bodyPr>
+            <a:lstStyle/>
+            <a:p>
+              <a:r>
+                <a:rPr lang="en-US" sz="2000" dirty="0" smtClean="0"/>
+                <a:t>App</a:t>
+              </a:r>
+              <a:endParaRPr lang="en-US" sz="2000" dirty="0"/>
+            </a:p>
+          </p:txBody>
+        </p:sp>
+        <p:cxnSp>
+          <p:nvCxnSpPr>
+            <p:cNvPr id="84" name="Straight Arrow Connector 83"/>
+            <p:cNvCxnSpPr/>
+            <p:nvPr/>
+          </p:nvCxnSpPr>
+          <p:spPr bwMode="auto">
+            <a:xfrm>
+              <a:off x="4267200" y="2209800"/>
+              <a:ext cx="0" cy="457200"/>
+            </a:xfrm>
+            <a:prstGeom prst="straightConnector1">
+              <a:avLst/>
+            </a:prstGeom>
+            <a:noFill/>
+            <a:ln w="9525" cap="flat" cmpd="sng" algn="ctr">
+              <a:solidFill>
+                <a:srgbClr val="3366FF"/>
+              </a:solidFill>
+              <a:prstDash val="solid"/>
+              <a:round/>
+              <a:headEnd type="triangle" w="med" len="med"/>
+              <a:tailEnd type="none" w="med" len="med"/>
+            </a:ln>
+            <a:effectLst/>
+          </p:spPr>
+        </p:cxnSp>
+        <p:sp>
+          <p:nvSpPr>
+            <p:cNvPr id="86" name="Rectangle 85"/>
+            <p:cNvSpPr/>
+            <p:nvPr/>
+          </p:nvSpPr>
+          <p:spPr bwMode="auto">
+            <a:xfrm>
+              <a:off x="3276600" y="1676400"/>
+              <a:ext cx="1295400" cy="533400"/>
+            </a:xfrm>
+            <a:prstGeom prst="rect">
+              <a:avLst/>
+            </a:prstGeom>
+            <a:noFill/>
+            <a:ln w="9525" cap="flat" cmpd="sng" algn="ctr">
+              <a:solidFill>
+                <a:schemeClr val="tx1"/>
+              </a:solidFill>
+              <a:prstDash val="dash"/>
+              <a:round/>
+              <a:headEnd type="none" w="med" len="med"/>
+              <a:tailEnd type="none" w="med" len="med"/>
+            </a:ln>
+            <a:effectLst/>
+          </p:spPr>
+          <p:txBody>
+            <a:bodyPr vert="horz" wrap="square" lIns="91440" tIns="45720" rIns="91440" bIns="45720" numCol="1" rtlCol="0" anchor="t" anchorCtr="0" compatLnSpc="1">
+              <a:prstTxWarp prst="textNoShape">
+                <a:avLst/>
+              </a:prstTxWarp>
+            </a:bodyPr>
+            <a:lstStyle/>
+            <a:p>
+              <a:pPr marL="0" marR="0" indent="0" algn="l" defTabSz="914400" rtl="0" eaLnBrk="1" fontAlgn="base" latinLnBrk="0" hangingPunct="1">
+                <a:lnSpc>
+                  <a:spcPct val="100000"/>
+                </a:lnSpc>
+                <a:spcBef>
+                  <a:spcPct val="0"/>
+                </a:spcBef>
+                <a:spcAft>
+                  <a:spcPct val="0"/>
+                </a:spcAft>
+                <a:buClrTx/>
+                <a:buSzTx/>
+                <a:buFontTx/>
+                <a:buNone/>
+                <a:tabLst/>
+              </a:pPr>
+              <a:endParaRPr kumimoji="0" lang="en-US" sz="1800" b="0" i="0" u="none" strike="noStrike" cap="none" normalizeH="0" baseline="0" smtClean="0">
+                <a:ln>
+                  <a:noFill/>
+                </a:ln>
+                <a:solidFill>
+                  <a:schemeClr val="tx1"/>
+                </a:solidFill>
+                <a:effectLst/>
+                <a:latin typeface="Arial" charset="0"/>
+              </a:endParaRPr>
+            </a:p>
+          </p:txBody>
+        </p:sp>
+        <p:sp>
+          <p:nvSpPr>
+            <p:cNvPr id="87" name="TextBox 86"/>
+            <p:cNvSpPr txBox="1"/>
+            <p:nvPr/>
+          </p:nvSpPr>
+          <p:spPr>
+            <a:xfrm>
+              <a:off x="3235411" y="1468394"/>
+              <a:ext cx="1018628" cy="276999"/>
+            </a:xfrm>
+            <a:prstGeom prst="rect">
+              <a:avLst/>
+            </a:prstGeom>
+            <a:noFill/>
+          </p:spPr>
+          <p:txBody>
+            <a:bodyPr wrap="none" rtlCol="0">
+              <a:spAutoFit/>
+            </a:bodyPr>
+            <a:lstStyle/>
+            <a:p>
+              <a:r>
+                <a:rPr lang="en-US" sz="1200" dirty="0" smtClean="0"/>
+                <a:t>App </a:t>
+              </a:r>
+              <a:r>
+                <a:rPr lang="en-US" sz="1200" dirty="0" smtClean="0"/>
+                <a:t>Display</a:t>
+              </a:r>
+              <a:endParaRPr lang="en-US" sz="1200" dirty="0"/>
+            </a:p>
+          </p:txBody>
+        </p:sp>
+        <p:cxnSp>
+          <p:nvCxnSpPr>
+            <p:cNvPr id="91" name="Straight Connector 90"/>
+            <p:cNvCxnSpPr/>
+            <p:nvPr/>
+          </p:nvCxnSpPr>
+          <p:spPr bwMode="auto">
+            <a:xfrm>
+              <a:off x="4572000" y="1982788"/>
+              <a:ext cx="1371600" cy="0"/>
+            </a:xfrm>
+            <a:prstGeom prst="line">
+              <a:avLst/>
+            </a:prstGeom>
+            <a:noFill/>
+            <a:ln w="9525" cap="flat" cmpd="sng" algn="ctr">
+              <a:solidFill>
+                <a:srgbClr val="A0D474"/>
+              </a:solidFill>
+              <a:prstDash val="solid"/>
+              <a:round/>
+              <a:headEnd type="none" w="med" len="med"/>
+              <a:tailEnd type="triangle" w="med" len="med"/>
+            </a:ln>
+            <a:effectLst/>
+          </p:spPr>
+        </p:cxnSp>
+        <p:sp>
+          <p:nvSpPr>
+            <p:cNvPr id="93" name="Text Box 23"/>
+            <p:cNvSpPr txBox="1">
+              <a:spLocks noChangeArrowheads="1"/>
+            </p:cNvSpPr>
+            <p:nvPr/>
+          </p:nvSpPr>
+          <p:spPr bwMode="auto">
+            <a:xfrm>
+              <a:off x="4780005" y="1777314"/>
+              <a:ext cx="990600" cy="261610"/>
+            </a:xfrm>
+            <a:prstGeom prst="rect">
+              <a:avLst/>
+            </a:prstGeom>
+            <a:noFill/>
+            <a:ln w="9525">
+              <a:noFill/>
+              <a:miter lim="800000"/>
+              <a:headEnd/>
+              <a:tailEnd/>
+            </a:ln>
+            <a:effectLst/>
+          </p:spPr>
+          <p:txBody>
+            <a:bodyPr wrap="square">
+              <a:spAutoFit/>
+            </a:bodyPr>
+            <a:lstStyle/>
+            <a:p>
+              <a:pPr>
+                <a:spcBef>
+                  <a:spcPct val="50000"/>
+                </a:spcBef>
+              </a:pPr>
+              <a:r>
+                <a:rPr lang="en-US" sz="1100" dirty="0" smtClean="0"/>
+                <a:t>View Display</a:t>
+              </a:r>
+            </a:p>
+          </p:txBody>
+        </p:sp>
+        <p:cxnSp>
+          <p:nvCxnSpPr>
+            <p:cNvPr id="94" name="Straight Connector 93"/>
+            <p:cNvCxnSpPr/>
+            <p:nvPr/>
+          </p:nvCxnSpPr>
+          <p:spPr bwMode="auto">
+            <a:xfrm flipH="1">
+              <a:off x="3581400" y="5716588"/>
+              <a:ext cx="2362200" cy="0"/>
+            </a:xfrm>
+            <a:prstGeom prst="line">
+              <a:avLst/>
+            </a:prstGeom>
+            <a:noFill/>
+            <a:ln w="9525" cap="flat" cmpd="sng" algn="ctr">
+              <a:solidFill>
+                <a:srgbClr val="A0D474"/>
+              </a:solidFill>
+              <a:prstDash val="solid"/>
+              <a:round/>
+              <a:headEnd type="none" w="med" len="med"/>
+              <a:tailEnd type="triangle" w="med" len="med"/>
+            </a:ln>
+            <a:effectLst/>
+          </p:spPr>
+        </p:cxnSp>
+        <p:cxnSp>
+          <p:nvCxnSpPr>
+            <p:cNvPr id="95" name="Straight Connector 94"/>
+            <p:cNvCxnSpPr/>
+            <p:nvPr/>
+          </p:nvCxnSpPr>
+          <p:spPr bwMode="auto">
+            <a:xfrm>
+              <a:off x="3581400" y="5564188"/>
+              <a:ext cx="2362200" cy="0"/>
+            </a:xfrm>
+            <a:prstGeom prst="line">
+              <a:avLst/>
+            </a:prstGeom>
+            <a:noFill/>
+            <a:ln w="9525" cap="flat" cmpd="sng" algn="ctr">
+              <a:solidFill>
+                <a:srgbClr val="A0D474"/>
+              </a:solidFill>
+              <a:prstDash val="solid"/>
+              <a:round/>
+              <a:headEnd type="none" w="med" len="med"/>
+              <a:tailEnd type="triangle" w="med" len="med"/>
+            </a:ln>
+            <a:effectLst/>
+          </p:spPr>
+        </p:cxnSp>
+        <p:sp>
+          <p:nvSpPr>
+            <p:cNvPr id="96" name="Text Box 23"/>
+            <p:cNvSpPr txBox="1">
+              <a:spLocks noChangeArrowheads="1"/>
+            </p:cNvSpPr>
+            <p:nvPr/>
+          </p:nvSpPr>
+          <p:spPr bwMode="auto">
+            <a:xfrm>
+              <a:off x="4038600" y="5669691"/>
+              <a:ext cx="1668162" cy="212116"/>
+            </a:xfrm>
+            <a:prstGeom prst="rect">
+              <a:avLst/>
+            </a:prstGeom>
+            <a:noFill/>
+            <a:ln w="9525">
+              <a:noFill/>
+              <a:miter lim="800000"/>
+              <a:headEnd/>
+              <a:tailEnd/>
+            </a:ln>
+            <a:effectLst/>
+          </p:spPr>
+          <p:txBody>
+            <a:bodyPr wrap="square">
+              <a:spAutoFit/>
+            </a:bodyPr>
+            <a:lstStyle/>
+            <a:p>
+              <a:pPr>
+                <a:spcBef>
+                  <a:spcPct val="50000"/>
+                </a:spcBef>
+              </a:pPr>
+              <a:r>
+                <a:rPr lang="en-US" sz="1100" dirty="0" smtClean="0"/>
+                <a:t>Configuration, Alarm Clear</a:t>
+              </a:r>
+            </a:p>
+          </p:txBody>
+        </p:sp>
+        <p:sp>
+          <p:nvSpPr>
+            <p:cNvPr id="97" name="Text Box 23"/>
+            <p:cNvSpPr txBox="1">
+              <a:spLocks noChangeArrowheads="1"/>
+            </p:cNvSpPr>
+            <p:nvPr/>
+          </p:nvSpPr>
+          <p:spPr bwMode="auto">
+            <a:xfrm>
+              <a:off x="4285735" y="5360772"/>
+              <a:ext cx="990600" cy="261610"/>
+            </a:xfrm>
+            <a:prstGeom prst="rect">
+              <a:avLst/>
+            </a:prstGeom>
+            <a:noFill/>
+            <a:ln w="9525">
+              <a:noFill/>
+              <a:miter lim="800000"/>
+              <a:headEnd/>
+              <a:tailEnd/>
+            </a:ln>
+            <a:effectLst/>
+          </p:spPr>
+          <p:txBody>
+            <a:bodyPr wrap="square">
+              <a:spAutoFit/>
+            </a:bodyPr>
+            <a:lstStyle/>
+            <a:p>
+              <a:pPr>
+                <a:spcBef>
+                  <a:spcPct val="50000"/>
+                </a:spcBef>
+              </a:pPr>
+              <a:r>
+                <a:rPr lang="en-US" sz="1100" dirty="0" smtClean="0"/>
+                <a:t>View Display</a:t>
+              </a:r>
+            </a:p>
+          </p:txBody>
+        </p:sp>
+        <p:cxnSp>
+          <p:nvCxnSpPr>
+            <p:cNvPr id="111" name="Straight Connector 110"/>
+            <p:cNvCxnSpPr/>
+            <p:nvPr/>
+          </p:nvCxnSpPr>
+          <p:spPr bwMode="auto">
+            <a:xfrm flipH="1">
+              <a:off x="4419600" y="6553200"/>
+              <a:ext cx="1524000" cy="0"/>
+            </a:xfrm>
+            <a:prstGeom prst="line">
+              <a:avLst/>
+            </a:prstGeom>
+            <a:noFill/>
+            <a:ln w="9525" cap="flat" cmpd="sng" algn="ctr">
+              <a:solidFill>
+                <a:srgbClr val="A0D474"/>
+              </a:solidFill>
+              <a:prstDash val="solid"/>
+              <a:round/>
+              <a:headEnd type="none" w="med" len="med"/>
+              <a:tailEnd type="triangle" w="med" len="med"/>
+            </a:ln>
+            <a:effectLst/>
+          </p:spPr>
+        </p:cxnSp>
+        <p:sp>
+          <p:nvSpPr>
+            <p:cNvPr id="113" name="Text Box 23"/>
+            <p:cNvSpPr txBox="1">
+              <a:spLocks noChangeArrowheads="1"/>
+            </p:cNvSpPr>
+            <p:nvPr/>
+          </p:nvSpPr>
+          <p:spPr bwMode="auto">
+            <a:xfrm>
+              <a:off x="4656438" y="6349313"/>
+              <a:ext cx="1260764" cy="261610"/>
+            </a:xfrm>
+            <a:prstGeom prst="rect">
+              <a:avLst/>
+            </a:prstGeom>
+            <a:noFill/>
+            <a:ln w="9525">
+              <a:noFill/>
+              <a:miter lim="800000"/>
+              <a:headEnd/>
+              <a:tailEnd/>
+            </a:ln>
+            <a:effectLst/>
+          </p:spPr>
+          <p:txBody>
+            <a:bodyPr wrap="square">
+              <a:spAutoFit/>
+            </a:bodyPr>
+            <a:lstStyle/>
+            <a:p>
+              <a:pPr>
+                <a:spcBef>
+                  <a:spcPct val="50000"/>
+                </a:spcBef>
+              </a:pPr>
+              <a:r>
+                <a:rPr lang="en-US" sz="1100" dirty="0" smtClean="0"/>
+                <a:t>Attach Sensors</a:t>
+              </a:r>
+            </a:p>
+          </p:txBody>
+        </p:sp>
+        <p:sp>
+          <p:nvSpPr>
+            <p:cNvPr id="50" name="Rectangle 49"/>
+            <p:cNvSpPr/>
+            <p:nvPr/>
+          </p:nvSpPr>
+          <p:spPr bwMode="auto">
+            <a:xfrm>
+              <a:off x="2895600" y="5486400"/>
+              <a:ext cx="685800" cy="685800"/>
+            </a:xfrm>
+            <a:prstGeom prst="rect">
+              <a:avLst/>
+            </a:prstGeom>
+            <a:solidFill>
+              <a:srgbClr val="00FDFE"/>
+            </a:solidFill>
+            <a:ln w="12700" cap="flat" cmpd="sng" algn="ctr">
+              <a:solidFill>
+                <a:schemeClr val="tx1"/>
+              </a:solidFill>
+              <a:prstDash val="solid"/>
+              <a:round/>
+              <a:headEnd type="none" w="med" len="med"/>
+              <a:tailEnd type="none" w="med" len="med"/>
+            </a:ln>
+            <a:effectLst/>
+          </p:spPr>
+          <p:txBody>
+            <a:bodyPr vert="horz" wrap="square" lIns="91440" tIns="45720" rIns="91440" bIns="45720" numCol="1" rtlCol="0" anchor="ctr" anchorCtr="0" compatLnSpc="1">
+              <a:prstTxWarp prst="textNoShape">
+                <a:avLst/>
+              </a:prstTxWarp>
+            </a:bodyPr>
+            <a:lstStyle/>
+            <a:p>
+              <a:pPr marL="0" marR="0" indent="0" algn="ctr" defTabSz="914400" rtl="0" eaLnBrk="1" fontAlgn="base" latinLnBrk="0" hangingPunct="1">
+                <a:lnSpc>
+                  <a:spcPct val="100000"/>
+                </a:lnSpc>
+                <a:spcBef>
+                  <a:spcPct val="0"/>
+                </a:spcBef>
+                <a:spcAft>
+                  <a:spcPct val="0"/>
+                </a:spcAft>
+                <a:buClrTx/>
+                <a:buSzTx/>
+                <a:buFontTx/>
+                <a:buNone/>
+                <a:tabLst/>
+              </a:pPr>
+              <a:r>
+                <a:rPr kumimoji="0" lang="en-US" sz="1400" b="0" i="0" u="none" strike="noStrike" cap="none" normalizeH="0" baseline="0" dirty="0" smtClean="0">
+                  <a:ln>
+                    <a:noFill/>
+                  </a:ln>
+                  <a:solidFill>
+                    <a:schemeClr val="tx1"/>
+                  </a:solidFill>
+                  <a:effectLst/>
+                  <a:latin typeface="Arial" charset="0"/>
+                </a:rPr>
+                <a:t>SPO</a:t>
+              </a:r>
+              <a:r>
+                <a:rPr kumimoji="0" lang="en-US" sz="1400" b="0" i="0" u="none" strike="noStrike" cap="none" normalizeH="0" baseline="-25000" dirty="0" smtClean="0">
+                  <a:ln>
+                    <a:noFill/>
+                  </a:ln>
+                  <a:solidFill>
+                    <a:schemeClr val="tx1"/>
+                  </a:solidFill>
+                  <a:effectLst/>
+                  <a:latin typeface="Arial" charset="0"/>
+                </a:rPr>
+                <a:t>2</a:t>
+              </a:r>
+            </a:p>
+          </p:txBody>
+        </p:sp>
+        <p:sp>
+          <p:nvSpPr>
+            <p:cNvPr id="78" name="Rectangle 16"/>
+            <p:cNvSpPr>
+              <a:spLocks noChangeArrowheads="1"/>
+            </p:cNvSpPr>
+            <p:nvPr/>
+          </p:nvSpPr>
+          <p:spPr bwMode="auto">
+            <a:xfrm rot="16200000">
+              <a:off x="3619500" y="4000500"/>
+              <a:ext cx="5029200" cy="381000"/>
+            </a:xfrm>
+            <a:prstGeom prst="rect">
+              <a:avLst/>
+            </a:prstGeom>
+            <a:solidFill>
+              <a:srgbClr val="A0D474">
+                <a:alpha val="63000"/>
+              </a:srgbClr>
+            </a:solidFill>
+            <a:ln w="9525">
+              <a:solidFill>
+                <a:schemeClr val="tx1"/>
+              </a:solidFill>
+              <a:miter lim="800000"/>
+              <a:headEnd/>
+              <a:tailEnd/>
+            </a:ln>
+            <a:effectLst/>
+          </p:spPr>
+          <p:txBody>
+            <a:bodyPr wrap="none" anchor="ctr"/>
+            <a:lstStyle/>
+            <a:p>
+              <a:pPr algn="ctr"/>
+              <a:r>
+                <a:rPr lang="en-US" dirty="0" smtClean="0"/>
+                <a:t>Clinician (App Administrator)</a:t>
+              </a:r>
+              <a:endParaRPr lang="en-US" dirty="0"/>
+            </a:p>
+          </p:txBody>
+        </p:sp>
+        <p:sp>
+          <p:nvSpPr>
+            <p:cNvPr id="28" name="Text Box 23"/>
+            <p:cNvSpPr txBox="1">
+              <a:spLocks noChangeArrowheads="1"/>
+            </p:cNvSpPr>
+            <p:nvPr/>
+          </p:nvSpPr>
+          <p:spPr bwMode="auto">
+            <a:xfrm>
+              <a:off x="4223951" y="2271584"/>
+              <a:ext cx="1143000" cy="430887"/>
+            </a:xfrm>
+            <a:prstGeom prst="rect">
+              <a:avLst/>
+            </a:prstGeom>
+            <a:noFill/>
+            <a:ln w="9525">
+              <a:noFill/>
+              <a:miter lim="800000"/>
+              <a:headEnd/>
+              <a:tailEnd/>
+            </a:ln>
+            <a:effectLst/>
+          </p:spPr>
+          <p:txBody>
+            <a:bodyPr wrap="square">
+              <a:spAutoFit/>
+            </a:bodyPr>
+            <a:lstStyle/>
+            <a:p>
+              <a:pPr>
+                <a:spcBef>
+                  <a:spcPct val="50000"/>
+                </a:spcBef>
+              </a:pPr>
+              <a:r>
+                <a:rPr lang="en-US" sz="1100" dirty="0" smtClean="0"/>
+                <a:t>Physiological Values</a:t>
+              </a:r>
+              <a:endParaRPr lang="en-US" sz="1100" dirty="0" smtClean="0"/>
+            </a:p>
+          </p:txBody>
+        </p:sp>
+      </p:grpSp>
+    </p:spTree>
+  </p:cSld>
+  <p:clrMapOvr>
+    <a:masterClrMapping/>
+  </p:clrMapOvr>
+  <p:timing>
+    <p:tnLst>
+      <p:par>
+        <p:cTn xmlns:p14="http://schemas.microsoft.com/office/powerpoint/2010/main" id="1" dur="indefinite" restart="never" nodeType="tmRoot"/>
+      </p:par>
+    </p:tnLst>
+  </p:timing>
+</p:sld>
+</file>
+
+<file path=ppt/slides/slide2.xml><?xml version="1.0" encoding="utf-8"?>
+<p:sld xmlns:a="http://schemas.openxmlformats.org/drawingml/2006/main" xmlns:r="http://schemas.openxmlformats.org/officeDocument/2006/relationships" xmlns:p="http://schemas.openxmlformats.org/presentationml/2006/main">
+  <p:cSld>
+    <p:spTree>
+      <p:nvGrpSpPr>
+        <p:cNvPr id="1" name=""/>
+        <p:cNvGrpSpPr/>
+        <p:nvPr/>
+      </p:nvGrpSpPr>
+      <p:grpSpPr>
+        <a:xfrm>
+          <a:off x="0" y="0"/>
+          <a:ext cx="0" cy="0"/>
+          <a:chOff x="0" y="0"/>
+          <a:chExt cx="0" cy="0"/>
+        </a:xfrm>
+      </p:grpSpPr>
+      <p:sp>
+        <p:nvSpPr>
+          <p:cNvPr id="43" name="Text Box 23"/>
           <p:cNvSpPr txBox="1">
             <a:spLocks noChangeArrowheads="1"/>
           </p:cNvSpPr>
@@ -3384,8 +4235,8 @@
         </p:nvSpPr>
         <p:spPr bwMode="auto">
           <a:xfrm>
-            <a:off x="3146828" y="4800600"/>
-            <a:ext cx="688571" cy="430887"/>
+            <a:off x="685800" y="5334000"/>
+            <a:ext cx="2467495" cy="430887"/>
           </a:xfrm>
           <a:prstGeom prst="rect">
             <a:avLst/>
@@ -3405,805 +4256,261 @@
           </a:bodyPr>
           <a:lstStyle/>
           <a:p>
-            <a:pPr>
+            <a:pPr algn="r">
               <a:spcBef>
                 <a:spcPct val="50000"/>
               </a:spcBef>
             </a:pPr>
             <a:r>
               <a:rPr lang="en-US" sz="1100" dirty="0" smtClean="0"/>
-              <a:t>Sensor Data</a:t>
-            </a:r>
-          </a:p>
-        </p:txBody>
-      </p:sp>
-      <p:sp>
-        <p:nvSpPr>
-          <p:cNvPr id="79" name="Rectangle 78"/>
-          <p:cNvSpPr/>
+              <a:t>MDCF Compatible Pulse </a:t>
+            </a:r>
+            <a:r>
+              <a:rPr lang="en-US" sz="1100" dirty="0" err="1" smtClean="0"/>
+              <a:t>Oximeter</a:t>
+            </a:r>
+            <a:r>
+              <a:rPr lang="en-US" sz="1100" dirty="0"/>
+              <a:t> </a:t>
+            </a:r>
+            <a:r>
+              <a:rPr lang="en-US" sz="1100" dirty="0" smtClean="0"/>
+              <a:t>interface conformant </a:t>
+            </a:r>
+            <a:r>
+              <a:rPr lang="en-US" sz="1100" dirty="0" smtClean="0"/>
+              <a:t>device</a:t>
+            </a:r>
+            <a:endParaRPr lang="en-US" sz="1100" dirty="0" smtClean="0"/>
+          </a:p>
+        </p:txBody>
+      </p:sp>
+      <p:grpSp>
+        <p:nvGrpSpPr>
+          <p:cNvPr id="2" name="Group 1"/>
+          <p:cNvGrpSpPr/>
           <p:nvPr/>
-        </p:nvSpPr>
-        <p:spPr bwMode="auto">
+        </p:nvGrpSpPr>
+        <p:grpSpPr>
           <a:xfrm>
-            <a:off x="2209800" y="2667000"/>
-            <a:ext cx="2590800" cy="1905000"/>
+            <a:off x="1752600" y="228600"/>
+            <a:ext cx="5638800" cy="6553201"/>
+            <a:chOff x="1752600" y="1468394"/>
+            <a:chExt cx="4572000" cy="5313406"/>
           </a:xfrm>
-          <a:prstGeom prst="rect">
-            <a:avLst/>
-          </a:prstGeom>
-          <a:noFill/>
-          <a:ln w="9525" cap="flat" cmpd="sng" algn="ctr">
-            <a:solidFill>
-              <a:schemeClr val="tx1"/>
-            </a:solidFill>
-            <a:prstDash val="solid"/>
-            <a:round/>
-            <a:headEnd type="none" w="med" len="med"/>
-            <a:tailEnd type="none" w="med" len="med"/>
-          </a:ln>
-          <a:effectLst/>
-        </p:spPr>
-        <p:txBody>
-          <a:bodyPr vert="horz" wrap="square" lIns="91440" tIns="45720" rIns="91440" bIns="45720" numCol="1" rtlCol="0" anchor="t" anchorCtr="0" compatLnSpc="1">
-            <a:prstTxWarp prst="textNoShape">
+        </p:grpSpPr>
+        <p:sp>
+          <p:nvSpPr>
+            <p:cNvPr id="2074" name="Line 26"/>
+            <p:cNvSpPr>
+              <a:spLocks noChangeShapeType="1"/>
+            </p:cNvSpPr>
+            <p:nvPr/>
+          </p:nvSpPr>
+          <p:spPr bwMode="auto">
+            <a:xfrm flipH="1">
+              <a:off x="3225799" y="6172200"/>
+              <a:ext cx="76199" cy="228600"/>
+            </a:xfrm>
+            <a:prstGeom prst="line">
               <a:avLst/>
-            </a:prstTxWarp>
-          </a:bodyPr>
-          <a:lstStyle/>
-          <a:p>
-            <a:pPr marL="0" marR="0" indent="0" algn="l" defTabSz="914400" rtl="0" eaLnBrk="1" fontAlgn="base" latinLnBrk="0" hangingPunct="1">
-              <a:lnSpc>
-                <a:spcPct val="100000"/>
-              </a:lnSpc>
-              <a:spcBef>
-                <a:spcPct val="0"/>
-              </a:spcBef>
-              <a:spcAft>
-                <a:spcPct val="0"/>
-              </a:spcAft>
-              <a:buClrTx/>
-              <a:buSzTx/>
-              <a:buFontTx/>
-              <a:buNone/>
-              <a:tabLst/>
-            </a:pPr>
-            <a:endParaRPr kumimoji="0" lang="en-US" sz="1800" b="0" i="0" u="none" strike="noStrike" cap="none" normalizeH="0" baseline="0" smtClean="0">
-              <a:ln>
-                <a:noFill/>
-              </a:ln>
+            </a:prstGeom>
+            <a:noFill/>
+            <a:ln w="9525" cap="flat" cmpd="sng" algn="ctr">
               <a:solidFill>
                 <a:schemeClr val="tx1"/>
               </a:solidFill>
-              <a:effectLst/>
-              <a:latin typeface="Arial" charset="0"/>
-            </a:endParaRPr>
-          </a:p>
-        </p:txBody>
-      </p:sp>
-      <p:sp>
-        <p:nvSpPr>
-          <p:cNvPr id="80" name="TextBox 79"/>
-          <p:cNvSpPr txBox="1"/>
-          <p:nvPr/>
-        </p:nvSpPr>
-        <p:spPr>
-          <a:xfrm>
-            <a:off x="2057400" y="2286000"/>
-            <a:ext cx="1697901" cy="400110"/>
-          </a:xfrm>
-          <a:prstGeom prst="rect">
-            <a:avLst/>
-          </a:prstGeom>
-          <a:noFill/>
-        </p:spPr>
-        <p:txBody>
-          <a:bodyPr wrap="none" rtlCol="0">
-            <a:spAutoFit/>
-          </a:bodyPr>
-          <a:lstStyle/>
-          <a:p>
-            <a:r>
-              <a:rPr lang="en-US" sz="2000" dirty="0" smtClean="0"/>
-              <a:t>ICE Manager</a:t>
-            </a:r>
-            <a:endParaRPr lang="en-US" sz="2000" dirty="0"/>
-          </a:p>
-        </p:txBody>
-      </p:sp>
-      <p:sp>
-        <p:nvSpPr>
-          <p:cNvPr id="81" name="Rectangle 80"/>
-          <p:cNvSpPr/>
-          <p:nvPr/>
-        </p:nvSpPr>
-        <p:spPr bwMode="auto">
-          <a:xfrm>
-            <a:off x="2895600" y="3124200"/>
-            <a:ext cx="1676400" cy="1219200"/>
-          </a:xfrm>
-          <a:prstGeom prst="rect">
-            <a:avLst/>
-          </a:prstGeom>
-          <a:noFill/>
-          <a:ln w="9525" cap="flat" cmpd="sng" algn="ctr">
+              <a:prstDash val="sysDash"/>
+              <a:round/>
+              <a:headEnd type="none" w="med" len="med"/>
+              <a:tailEnd type="triangle" w="med" len="med"/>
+            </a:ln>
+            <a:effectLst/>
+          </p:spPr>
+          <p:txBody>
+            <a:bodyPr/>
+            <a:lstStyle/>
+            <a:p>
+              <a:endParaRPr lang="en-US"/>
+            </a:p>
+          </p:txBody>
+        </p:sp>
+        <p:sp>
+          <p:nvSpPr>
+            <p:cNvPr id="41" name="Rectangle 16"/>
+            <p:cNvSpPr>
+              <a:spLocks noChangeArrowheads="1"/>
+            </p:cNvSpPr>
+            <p:nvPr/>
+          </p:nvSpPr>
+          <p:spPr bwMode="auto">
+            <a:xfrm>
+              <a:off x="1752600" y="6400800"/>
+              <a:ext cx="2667000" cy="381000"/>
+            </a:xfrm>
+            <a:prstGeom prst="rect">
+              <a:avLst/>
+            </a:prstGeom>
             <a:solidFill>
-              <a:schemeClr val="tx1"/>
+              <a:srgbClr val="99CCFF">
+                <a:alpha val="63000"/>
+              </a:srgbClr>
             </a:solidFill>
-            <a:prstDash val="solid"/>
-            <a:round/>
-            <a:headEnd type="none" w="med" len="med"/>
-            <a:tailEnd type="none" w="med" len="med"/>
-          </a:ln>
-          <a:effectLst/>
-        </p:spPr>
-        <p:txBody>
-          <a:bodyPr vert="horz" wrap="square" lIns="91440" tIns="45720" rIns="91440" bIns="45720" numCol="1" rtlCol="0" anchor="t" anchorCtr="0" compatLnSpc="1">
-            <a:prstTxWarp prst="textNoShape">
-              <a:avLst/>
-            </a:prstTxWarp>
-          </a:bodyPr>
-          <a:lstStyle/>
-          <a:p>
-            <a:pPr marL="0" marR="0" indent="0" algn="l" defTabSz="914400" rtl="0" eaLnBrk="1" fontAlgn="base" latinLnBrk="0" hangingPunct="1">
-              <a:lnSpc>
-                <a:spcPct val="100000"/>
-              </a:lnSpc>
-              <a:spcBef>
-                <a:spcPct val="0"/>
-              </a:spcBef>
-              <a:spcAft>
-                <a:spcPct val="0"/>
-              </a:spcAft>
-              <a:buClrTx/>
-              <a:buSzTx/>
-              <a:buFontTx/>
-              <a:buNone/>
-              <a:tabLst/>
-            </a:pPr>
-            <a:endParaRPr kumimoji="0" lang="en-US" sz="1800" b="0" i="0" u="none" strike="noStrike" cap="none" normalizeH="0" baseline="0" smtClean="0">
-              <a:ln>
-                <a:noFill/>
-              </a:ln>
+            <a:ln w="9525">
               <a:solidFill>
                 <a:schemeClr val="tx1"/>
               </a:solidFill>
-              <a:effectLst/>
-              <a:latin typeface="Arial" charset="0"/>
-            </a:endParaRPr>
-          </a:p>
-        </p:txBody>
-      </p:sp>
-      <p:sp>
-        <p:nvSpPr>
-          <p:cNvPr id="82" name="TextBox 81"/>
-          <p:cNvSpPr txBox="1"/>
-          <p:nvPr/>
-        </p:nvSpPr>
-        <p:spPr>
-          <a:xfrm>
-            <a:off x="4038600" y="2743200"/>
-            <a:ext cx="653845" cy="400110"/>
-          </a:xfrm>
-          <a:prstGeom prst="rect">
-            <a:avLst/>
-          </a:prstGeom>
-          <a:noFill/>
-        </p:spPr>
-        <p:txBody>
-          <a:bodyPr wrap="none" rtlCol="0">
-            <a:spAutoFit/>
-          </a:bodyPr>
-          <a:lstStyle/>
-          <a:p>
-            <a:r>
-              <a:rPr lang="en-US" sz="2000" dirty="0" smtClean="0"/>
-              <a:t>App</a:t>
-            </a:r>
-            <a:endParaRPr lang="en-US" sz="2000" dirty="0"/>
-          </a:p>
-        </p:txBody>
-      </p:sp>
-      <p:cxnSp>
-        <p:nvCxnSpPr>
-          <p:cNvPr id="84" name="Straight Arrow Connector 83"/>
-          <p:cNvCxnSpPr/>
-          <p:nvPr/>
-        </p:nvCxnSpPr>
-        <p:spPr bwMode="auto">
-          <a:xfrm>
-            <a:off x="4267200" y="2209800"/>
-            <a:ext cx="0" cy="457200"/>
-          </a:xfrm>
-          <a:prstGeom prst="straightConnector1">
-            <a:avLst/>
-          </a:prstGeom>
-          <a:noFill/>
-          <a:ln w="9525" cap="flat" cmpd="sng" algn="ctr">
-            <a:solidFill>
-              <a:srgbClr val="3366FF"/>
-            </a:solidFill>
-            <a:prstDash val="solid"/>
-            <a:round/>
-            <a:headEnd type="triangle" w="med" len="med"/>
-            <a:tailEnd type="none" w="med" len="med"/>
-          </a:ln>
-          <a:effectLst/>
-        </p:spPr>
-      </p:cxnSp>
-      <p:sp>
-        <p:nvSpPr>
-          <p:cNvPr id="86" name="Rectangle 85"/>
-          <p:cNvSpPr/>
-          <p:nvPr/>
-        </p:nvSpPr>
-        <p:spPr bwMode="auto">
-          <a:xfrm>
-            <a:off x="3276600" y="1676400"/>
-            <a:ext cx="1295400" cy="533400"/>
-          </a:xfrm>
-          <a:prstGeom prst="rect">
-            <a:avLst/>
-          </a:prstGeom>
-          <a:noFill/>
-          <a:ln w="9525" cap="flat" cmpd="sng" algn="ctr">
-            <a:solidFill>
-              <a:schemeClr val="tx1"/>
-            </a:solidFill>
-            <a:prstDash val="dash"/>
-            <a:round/>
-            <a:headEnd type="none" w="med" len="med"/>
-            <a:tailEnd type="none" w="med" len="med"/>
-          </a:ln>
-          <a:effectLst/>
-        </p:spPr>
-        <p:txBody>
-          <a:bodyPr vert="horz" wrap="square" lIns="91440" tIns="45720" rIns="91440" bIns="45720" numCol="1" rtlCol="0" anchor="t" anchorCtr="0" compatLnSpc="1">
-            <a:prstTxWarp prst="textNoShape">
+              <a:miter lim="800000"/>
+              <a:headEnd/>
+              <a:tailEnd/>
+            </a:ln>
+            <a:effectLst/>
+          </p:spPr>
+          <p:txBody>
+            <a:bodyPr wrap="none" anchor="ctr"/>
+            <a:lstStyle/>
+            <a:p>
+              <a:pPr algn="ctr"/>
+              <a:r>
+                <a:rPr lang="en-US" dirty="0"/>
+                <a:t>Patient</a:t>
+              </a:r>
+            </a:p>
+          </p:txBody>
+        </p:sp>
+        <p:cxnSp>
+          <p:nvCxnSpPr>
+            <p:cNvPr id="61" name="Straight Connector 60"/>
+            <p:cNvCxnSpPr/>
+            <p:nvPr/>
+          </p:nvCxnSpPr>
+          <p:spPr bwMode="auto">
+            <a:xfrm flipV="1">
+              <a:off x="3148806" y="4572000"/>
+              <a:ext cx="0" cy="915194"/>
+            </a:xfrm>
+            <a:prstGeom prst="line">
               <a:avLst/>
-            </a:prstTxWarp>
-          </a:bodyPr>
-          <a:lstStyle/>
-          <a:p>
-            <a:pPr marL="0" marR="0" indent="0" algn="l" defTabSz="914400" rtl="0" eaLnBrk="1" fontAlgn="base" latinLnBrk="0" hangingPunct="1">
-              <a:lnSpc>
-                <a:spcPct val="100000"/>
-              </a:lnSpc>
-              <a:spcBef>
-                <a:spcPct val="0"/>
-              </a:spcBef>
-              <a:spcAft>
-                <a:spcPct val="0"/>
-              </a:spcAft>
-              <a:buClrTx/>
-              <a:buSzTx/>
-              <a:buFontTx/>
-              <a:buNone/>
-              <a:tabLst/>
-            </a:pPr>
-            <a:endParaRPr kumimoji="0" lang="en-US" sz="1800" b="0" i="0" u="none" strike="noStrike" cap="none" normalizeH="0" baseline="0" smtClean="0">
-              <a:ln>
-                <a:noFill/>
-              </a:ln>
+            </a:prstGeom>
+            <a:noFill/>
+            <a:ln w="9525" cap="flat" cmpd="sng" algn="ctr">
+              <a:solidFill>
+                <a:srgbClr val="3366FF"/>
+              </a:solidFill>
+              <a:prstDash val="solid"/>
+              <a:round/>
+              <a:headEnd type="none" w="med" len="med"/>
+              <a:tailEnd type="triangle" w="med" len="med"/>
+            </a:ln>
+            <a:effectLst/>
+          </p:spPr>
+        </p:cxnSp>
+        <p:sp>
+          <p:nvSpPr>
+            <p:cNvPr id="68" name="Text Box 23"/>
+            <p:cNvSpPr txBox="1">
+              <a:spLocks noChangeArrowheads="1"/>
+            </p:cNvSpPr>
+            <p:nvPr/>
+          </p:nvSpPr>
+          <p:spPr bwMode="auto">
+            <a:xfrm>
+              <a:off x="3121429" y="4800600"/>
+              <a:ext cx="917171" cy="349368"/>
+            </a:xfrm>
+            <a:prstGeom prst="rect">
+              <a:avLst/>
+            </a:prstGeom>
+            <a:noFill/>
+            <a:ln w="9525">
+              <a:noFill/>
+              <a:miter lim="800000"/>
+              <a:headEnd/>
+              <a:tailEnd/>
+            </a:ln>
+            <a:effectLst/>
+          </p:spPr>
+          <p:txBody>
+            <a:bodyPr wrap="square">
+              <a:spAutoFit/>
+            </a:bodyPr>
+            <a:lstStyle/>
+            <a:p>
+              <a:pPr>
+                <a:spcBef>
+                  <a:spcPct val="50000"/>
+                </a:spcBef>
+              </a:pPr>
+              <a:r>
+                <a:rPr lang="en-US" sz="1100" i="1" dirty="0" smtClean="0">
+                  <a:solidFill>
+                    <a:srgbClr val="FF0000"/>
+                  </a:solidFill>
+                </a:rPr>
+                <a:t>Incorrect Sensor </a:t>
+              </a:r>
+              <a:r>
+                <a:rPr lang="en-US" sz="1100" i="1" dirty="0" smtClean="0">
+                  <a:solidFill>
+                    <a:srgbClr val="FF0000"/>
+                  </a:solidFill>
+                </a:rPr>
+                <a:t>Data</a:t>
+              </a:r>
+            </a:p>
+          </p:txBody>
+        </p:sp>
+        <p:sp>
+          <p:nvSpPr>
+            <p:cNvPr id="79" name="Rectangle 78"/>
+            <p:cNvSpPr/>
+            <p:nvPr/>
+          </p:nvSpPr>
+          <p:spPr bwMode="auto">
+            <a:xfrm>
+              <a:off x="2209800" y="2667000"/>
+              <a:ext cx="2590800" cy="1905000"/>
+            </a:xfrm>
+            <a:prstGeom prst="rect">
+              <a:avLst/>
+            </a:prstGeom>
+            <a:noFill/>
+            <a:ln w="9525" cap="flat" cmpd="sng" algn="ctr">
               <a:solidFill>
                 <a:schemeClr val="tx1"/>
               </a:solidFill>
-              <a:effectLst/>
-              <a:latin typeface="Arial" charset="0"/>
-            </a:endParaRPr>
-          </a:p>
-        </p:txBody>
-      </p:sp>
-      <p:sp>
-        <p:nvSpPr>
-          <p:cNvPr id="87" name="TextBox 86"/>
-          <p:cNvSpPr txBox="1"/>
-          <p:nvPr/>
-        </p:nvSpPr>
-        <p:spPr>
-          <a:xfrm>
-            <a:off x="3200400" y="1371600"/>
-            <a:ext cx="1296599" cy="276999"/>
-          </a:xfrm>
-          <a:prstGeom prst="rect">
-            <a:avLst/>
-          </a:prstGeom>
-          <a:noFill/>
-        </p:spPr>
-        <p:txBody>
-          <a:bodyPr wrap="none" rtlCol="0">
-            <a:spAutoFit/>
-          </a:bodyPr>
-          <a:lstStyle/>
-          <a:p>
-            <a:r>
-              <a:rPr lang="en-US" sz="1200" dirty="0" smtClean="0"/>
-              <a:t>SUI App Display</a:t>
-            </a:r>
-            <a:endParaRPr lang="en-US" sz="1200" dirty="0"/>
-          </a:p>
-        </p:txBody>
-      </p:sp>
-      <p:cxnSp>
-        <p:nvCxnSpPr>
-          <p:cNvPr id="91" name="Straight Connector 90"/>
-          <p:cNvCxnSpPr/>
-          <p:nvPr/>
-        </p:nvCxnSpPr>
-        <p:spPr bwMode="auto">
-          <a:xfrm>
-            <a:off x="4572000" y="1982788"/>
-            <a:ext cx="1371600" cy="0"/>
-          </a:xfrm>
-          <a:prstGeom prst="line">
-            <a:avLst/>
-          </a:prstGeom>
-          <a:noFill/>
-          <a:ln w="9525" cap="flat" cmpd="sng" algn="ctr">
-            <a:solidFill>
-              <a:srgbClr val="A0D474"/>
-            </a:solidFill>
-            <a:prstDash val="solid"/>
-            <a:round/>
-            <a:headEnd type="none" w="med" len="med"/>
-            <a:tailEnd type="triangle" w="med" len="med"/>
-          </a:ln>
-          <a:effectLst/>
-        </p:spPr>
-      </p:cxnSp>
-      <p:sp>
-        <p:nvSpPr>
-          <p:cNvPr id="93" name="Text Box 23"/>
-          <p:cNvSpPr txBox="1">
-            <a:spLocks noChangeArrowheads="1"/>
-          </p:cNvSpPr>
-          <p:nvPr/>
-        </p:nvSpPr>
-        <p:spPr bwMode="auto">
-          <a:xfrm>
-            <a:off x="4800600" y="1752600"/>
-            <a:ext cx="990600" cy="261610"/>
-          </a:xfrm>
-          <a:prstGeom prst="rect">
-            <a:avLst/>
-          </a:prstGeom>
-          <a:noFill/>
-          <a:ln w="9525">
-            <a:noFill/>
-            <a:miter lim="800000"/>
-            <a:headEnd/>
-            <a:tailEnd/>
-          </a:ln>
-          <a:effectLst/>
-        </p:spPr>
-        <p:txBody>
-          <a:bodyPr wrap="square">
-            <a:spAutoFit/>
-          </a:bodyPr>
-          <a:lstStyle/>
-          <a:p>
-            <a:pPr>
-              <a:spcBef>
-                <a:spcPct val="50000"/>
-              </a:spcBef>
-            </a:pPr>
-            <a:r>
-              <a:rPr lang="en-US" sz="1100" dirty="0" smtClean="0"/>
-              <a:t>View Display</a:t>
-            </a:r>
-          </a:p>
-        </p:txBody>
-      </p:sp>
-      <p:cxnSp>
-        <p:nvCxnSpPr>
-          <p:cNvPr id="94" name="Straight Connector 93"/>
-          <p:cNvCxnSpPr/>
-          <p:nvPr/>
-        </p:nvCxnSpPr>
-        <p:spPr bwMode="auto">
-          <a:xfrm flipH="1">
-            <a:off x="3581400" y="5716588"/>
-            <a:ext cx="2362200" cy="0"/>
-          </a:xfrm>
-          <a:prstGeom prst="line">
-            <a:avLst/>
-          </a:prstGeom>
-          <a:noFill/>
-          <a:ln w="9525" cap="flat" cmpd="sng" algn="ctr">
-            <a:solidFill>
-              <a:srgbClr val="A0D474"/>
-            </a:solidFill>
-            <a:prstDash val="solid"/>
-            <a:round/>
-            <a:headEnd type="none" w="med" len="med"/>
-            <a:tailEnd type="triangle" w="med" len="med"/>
-          </a:ln>
-          <a:effectLst/>
-        </p:spPr>
-      </p:cxnSp>
-      <p:cxnSp>
-        <p:nvCxnSpPr>
-          <p:cNvPr id="95" name="Straight Connector 94"/>
-          <p:cNvCxnSpPr/>
-          <p:nvPr/>
-        </p:nvCxnSpPr>
-        <p:spPr bwMode="auto">
-          <a:xfrm>
-            <a:off x="3581400" y="5564188"/>
-            <a:ext cx="2362200" cy="0"/>
-          </a:xfrm>
-          <a:prstGeom prst="line">
-            <a:avLst/>
-          </a:prstGeom>
-          <a:noFill/>
-          <a:ln w="9525" cap="flat" cmpd="sng" algn="ctr">
-            <a:solidFill>
-              <a:srgbClr val="A0D474"/>
-            </a:solidFill>
-            <a:prstDash val="solid"/>
-            <a:round/>
-            <a:headEnd type="none" w="med" len="med"/>
-            <a:tailEnd type="triangle" w="med" len="med"/>
-          </a:ln>
-          <a:effectLst/>
-        </p:spPr>
-      </p:cxnSp>
-      <p:sp>
-        <p:nvSpPr>
-          <p:cNvPr id="96" name="Text Box 23"/>
-          <p:cNvSpPr txBox="1">
-            <a:spLocks noChangeArrowheads="1"/>
-          </p:cNvSpPr>
-          <p:nvPr/>
-        </p:nvSpPr>
-        <p:spPr bwMode="auto">
-          <a:xfrm>
-            <a:off x="4038600" y="5638800"/>
-            <a:ext cx="1080655" cy="430887"/>
-          </a:xfrm>
-          <a:prstGeom prst="rect">
-            <a:avLst/>
-          </a:prstGeom>
-          <a:noFill/>
-          <a:ln w="9525">
-            <a:noFill/>
-            <a:miter lim="800000"/>
-            <a:headEnd/>
-            <a:tailEnd/>
-          </a:ln>
-          <a:effectLst/>
-        </p:spPr>
-        <p:txBody>
-          <a:bodyPr wrap="square">
-            <a:spAutoFit/>
-          </a:bodyPr>
-          <a:lstStyle/>
-          <a:p>
-            <a:pPr>
-              <a:spcBef>
-                <a:spcPct val="50000"/>
-              </a:spcBef>
-            </a:pPr>
-            <a:r>
-              <a:rPr lang="en-US" sz="1100" dirty="0" smtClean="0"/>
-              <a:t>Configuration, Alarm Clear</a:t>
-            </a:r>
-          </a:p>
-        </p:txBody>
-      </p:sp>
-      <p:sp>
-        <p:nvSpPr>
-          <p:cNvPr id="97" name="Text Box 23"/>
-          <p:cNvSpPr txBox="1">
-            <a:spLocks noChangeArrowheads="1"/>
-          </p:cNvSpPr>
-          <p:nvPr/>
-        </p:nvSpPr>
-        <p:spPr bwMode="auto">
-          <a:xfrm>
-            <a:off x="4114800" y="5334000"/>
-            <a:ext cx="990600" cy="261610"/>
-          </a:xfrm>
-          <a:prstGeom prst="rect">
-            <a:avLst/>
-          </a:prstGeom>
-          <a:noFill/>
-          <a:ln w="9525">
-            <a:noFill/>
-            <a:miter lim="800000"/>
-            <a:headEnd/>
-            <a:tailEnd/>
-          </a:ln>
-          <a:effectLst/>
-        </p:spPr>
-        <p:txBody>
-          <a:bodyPr wrap="square">
-            <a:spAutoFit/>
-          </a:bodyPr>
-          <a:lstStyle/>
-          <a:p>
-            <a:pPr>
-              <a:spcBef>
-                <a:spcPct val="50000"/>
-              </a:spcBef>
-            </a:pPr>
-            <a:r>
-              <a:rPr lang="en-US" sz="1100" dirty="0" smtClean="0"/>
-              <a:t>View Display</a:t>
-            </a:r>
-          </a:p>
-        </p:txBody>
-      </p:sp>
-      <p:sp>
-        <p:nvSpPr>
-          <p:cNvPr id="104" name="Rectangle 103"/>
-          <p:cNvSpPr/>
-          <p:nvPr/>
-        </p:nvSpPr>
-        <p:spPr bwMode="auto">
-          <a:xfrm>
-            <a:off x="457200" y="3733800"/>
-            <a:ext cx="1371600" cy="609600"/>
-          </a:xfrm>
-          <a:prstGeom prst="rect">
-            <a:avLst/>
-          </a:prstGeom>
-          <a:noFill/>
-          <a:ln w="9525" cap="flat" cmpd="sng" algn="ctr">
-            <a:solidFill>
-              <a:schemeClr val="tx1"/>
-            </a:solidFill>
-            <a:prstDash val="solid"/>
-            <a:round/>
-            <a:headEnd type="none" w="med" len="med"/>
-            <a:tailEnd type="none" w="med" len="med"/>
-          </a:ln>
-          <a:effectLst/>
-        </p:spPr>
-        <p:txBody>
-          <a:bodyPr vert="horz" wrap="square" lIns="91440" tIns="45720" rIns="91440" bIns="45720" numCol="1" rtlCol="0" anchor="t" anchorCtr="0" compatLnSpc="1">
-            <a:prstTxWarp prst="textNoShape">
-              <a:avLst/>
-            </a:prstTxWarp>
-          </a:bodyPr>
-          <a:lstStyle/>
-          <a:p>
-            <a:pPr marL="0" marR="0" indent="0" algn="l" defTabSz="914400" rtl="0" eaLnBrk="1" fontAlgn="base" latinLnBrk="0" hangingPunct="1">
-              <a:lnSpc>
-                <a:spcPct val="100000"/>
-              </a:lnSpc>
-              <a:spcBef>
-                <a:spcPct val="0"/>
-              </a:spcBef>
-              <a:spcAft>
-                <a:spcPct val="0"/>
-              </a:spcAft>
-              <a:buClrTx/>
-              <a:buSzTx/>
-              <a:buFontTx/>
-              <a:buNone/>
-              <a:tabLst/>
-            </a:pPr>
-            <a:endParaRPr kumimoji="0" lang="en-US" sz="1800" b="0" i="0" u="none" strike="noStrike" cap="none" normalizeH="0" baseline="0" smtClean="0">
-              <a:ln>
-                <a:noFill/>
-              </a:ln>
-              <a:solidFill>
-                <a:schemeClr val="tx1"/>
-              </a:solidFill>
-              <a:effectLst/>
-              <a:latin typeface="Arial" charset="0"/>
-            </a:endParaRPr>
-          </a:p>
-        </p:txBody>
-      </p:sp>
-      <p:sp>
-        <p:nvSpPr>
-          <p:cNvPr id="105" name="TextBox 104"/>
-          <p:cNvSpPr txBox="1"/>
-          <p:nvPr/>
-        </p:nvSpPr>
-        <p:spPr>
-          <a:xfrm>
-            <a:off x="381000" y="4343400"/>
-            <a:ext cx="1235416" cy="261610"/>
-          </a:xfrm>
-          <a:prstGeom prst="rect">
-            <a:avLst/>
-          </a:prstGeom>
-          <a:noFill/>
-        </p:spPr>
-        <p:txBody>
-          <a:bodyPr wrap="none" rtlCol="0">
-            <a:spAutoFit/>
-          </a:bodyPr>
-          <a:lstStyle/>
-          <a:p>
-            <a:r>
-              <a:rPr lang="en-US" sz="1100" dirty="0" smtClean="0"/>
-              <a:t>ICE Data Logger</a:t>
-            </a:r>
-            <a:endParaRPr lang="en-US" sz="1100" dirty="0"/>
-          </a:p>
-        </p:txBody>
-      </p:sp>
-      <p:cxnSp>
-        <p:nvCxnSpPr>
-          <p:cNvPr id="107" name="Straight Connector 106"/>
-          <p:cNvCxnSpPr/>
-          <p:nvPr/>
-        </p:nvCxnSpPr>
-        <p:spPr bwMode="auto">
-          <a:xfrm flipH="1">
-            <a:off x="1828800" y="4191000"/>
-            <a:ext cx="1066800" cy="0"/>
-          </a:xfrm>
-          <a:prstGeom prst="line">
-            <a:avLst/>
-          </a:prstGeom>
-          <a:noFill/>
-          <a:ln w="9525" cap="flat" cmpd="sng" algn="ctr">
-            <a:solidFill>
-              <a:srgbClr val="0000FF"/>
-            </a:solidFill>
-            <a:prstDash val="solid"/>
-            <a:round/>
-            <a:headEnd type="none" w="med" len="med"/>
-            <a:tailEnd type="triangle" w="med" len="med"/>
-          </a:ln>
-          <a:effectLst/>
-        </p:spPr>
-      </p:cxnSp>
-      <p:cxnSp>
-        <p:nvCxnSpPr>
-          <p:cNvPr id="111" name="Straight Connector 110"/>
-          <p:cNvCxnSpPr/>
-          <p:nvPr/>
-        </p:nvCxnSpPr>
-        <p:spPr bwMode="auto">
-          <a:xfrm flipH="1">
-            <a:off x="4419600" y="6553200"/>
-            <a:ext cx="1524000" cy="0"/>
-          </a:xfrm>
-          <a:prstGeom prst="line">
-            <a:avLst/>
-          </a:prstGeom>
-          <a:noFill/>
-          <a:ln w="9525" cap="flat" cmpd="sng" algn="ctr">
-            <a:solidFill>
-              <a:srgbClr val="A0D474"/>
-            </a:solidFill>
-            <a:prstDash val="solid"/>
-            <a:round/>
-            <a:headEnd type="none" w="med" len="med"/>
-            <a:tailEnd type="triangle" w="med" len="med"/>
-          </a:ln>
-          <a:effectLst/>
-        </p:spPr>
-      </p:cxnSp>
-      <p:sp>
-        <p:nvSpPr>
-          <p:cNvPr id="113" name="Text Box 23"/>
-          <p:cNvSpPr txBox="1">
-            <a:spLocks noChangeArrowheads="1"/>
-          </p:cNvSpPr>
-          <p:nvPr/>
-        </p:nvSpPr>
-        <p:spPr bwMode="auto">
-          <a:xfrm>
-            <a:off x="4648200" y="6324600"/>
-            <a:ext cx="1260764" cy="261610"/>
-          </a:xfrm>
-          <a:prstGeom prst="rect">
-            <a:avLst/>
-          </a:prstGeom>
-          <a:noFill/>
-          <a:ln w="9525">
-            <a:noFill/>
-            <a:miter lim="800000"/>
-            <a:headEnd/>
-            <a:tailEnd/>
-          </a:ln>
-          <a:effectLst/>
-        </p:spPr>
-        <p:txBody>
-          <a:bodyPr wrap="square">
-            <a:spAutoFit/>
-          </a:bodyPr>
-          <a:lstStyle/>
-          <a:p>
-            <a:pPr>
-              <a:spcBef>
-                <a:spcPct val="50000"/>
-              </a:spcBef>
-            </a:pPr>
-            <a:r>
-              <a:rPr lang="en-US" sz="1100" dirty="0" smtClean="0"/>
-              <a:t>Attach Sensors</a:t>
-            </a:r>
-          </a:p>
-        </p:txBody>
-      </p:sp>
-      <p:cxnSp>
-        <p:nvCxnSpPr>
-          <p:cNvPr id="44" name="Straight Connector 43"/>
-          <p:cNvCxnSpPr/>
-          <p:nvPr/>
-        </p:nvCxnSpPr>
-        <p:spPr bwMode="auto">
-          <a:xfrm rot="10800000">
-            <a:off x="1828800" y="3962400"/>
-            <a:ext cx="381000" cy="1588"/>
-          </a:xfrm>
-          <a:prstGeom prst="line">
-            <a:avLst/>
-          </a:prstGeom>
-          <a:noFill/>
-          <a:ln w="9525" cap="flat" cmpd="sng" algn="ctr">
-            <a:solidFill>
-              <a:srgbClr val="0000FF"/>
-            </a:solidFill>
-            <a:prstDash val="solid"/>
-            <a:round/>
-            <a:headEnd type="none" w="med" len="med"/>
-            <a:tailEnd type="triangle" w="med" len="med"/>
-          </a:ln>
-          <a:effectLst/>
-        </p:spPr>
-      </p:cxnSp>
-      <p:sp>
-        <p:nvSpPr>
-          <p:cNvPr id="50" name="Rectangle 49"/>
-          <p:cNvSpPr/>
-          <p:nvPr/>
-        </p:nvSpPr>
-        <p:spPr bwMode="auto">
-          <a:xfrm>
-            <a:off x="2895600" y="5486400"/>
-            <a:ext cx="685800" cy="685800"/>
-          </a:xfrm>
-          <a:prstGeom prst="rect">
-            <a:avLst/>
-          </a:prstGeom>
-          <a:solidFill>
-            <a:srgbClr val="00FDFE"/>
-          </a:solidFill>
-          <a:ln w="12700" cap="flat" cmpd="sng" algn="ctr">
-            <a:solidFill>
-              <a:schemeClr val="tx1"/>
-            </a:solidFill>
-            <a:prstDash val="solid"/>
-            <a:round/>
-            <a:headEnd type="none" w="med" len="med"/>
-            <a:tailEnd type="none" w="med" len="med"/>
-          </a:ln>
-          <a:effectLst/>
-        </p:spPr>
-        <p:txBody>
-          <a:bodyPr vert="horz" wrap="square" lIns="91440" tIns="45720" rIns="91440" bIns="45720" numCol="1" rtlCol="0" anchor="ctr" anchorCtr="0" compatLnSpc="1">
-            <a:prstTxWarp prst="textNoShape">
-              <a:avLst/>
-            </a:prstTxWarp>
-          </a:bodyPr>
-          <a:lstStyle/>
-          <a:p>
-            <a:pPr marL="0" marR="0" indent="0" algn="ctr" defTabSz="914400" rtl="0" eaLnBrk="1" fontAlgn="base" latinLnBrk="0" hangingPunct="1">
-              <a:lnSpc>
-                <a:spcPct val="100000"/>
-              </a:lnSpc>
-              <a:spcBef>
-                <a:spcPct val="0"/>
-              </a:spcBef>
-              <a:spcAft>
-                <a:spcPct val="0"/>
-              </a:spcAft>
-              <a:buClrTx/>
-              <a:buSzTx/>
-              <a:buFontTx/>
-              <a:buNone/>
-              <a:tabLst/>
-            </a:pPr>
-            <a:r>
-              <a:rPr kumimoji="0" lang="en-US" sz="1200" b="0" i="0" u="none" strike="noStrike" cap="none" normalizeH="0" baseline="0" dirty="0" smtClean="0">
+              <a:prstDash val="solid"/>
+              <a:round/>
+              <a:headEnd type="none" w="med" len="med"/>
+              <a:tailEnd type="none" w="med" len="med"/>
+            </a:ln>
+            <a:effectLst/>
+          </p:spPr>
+          <p:txBody>
+            <a:bodyPr vert="horz" wrap="square" lIns="91440" tIns="45720" rIns="91440" bIns="45720" numCol="1" rtlCol="0" anchor="t" anchorCtr="0" compatLnSpc="1">
+              <a:prstTxWarp prst="textNoShape">
+                <a:avLst/>
+              </a:prstTxWarp>
+            </a:bodyPr>
+            <a:lstStyle/>
+            <a:p>
+              <a:pPr marL="0" marR="0" indent="0" algn="l" defTabSz="914400" rtl="0" eaLnBrk="1" fontAlgn="base" latinLnBrk="0" hangingPunct="1">
+                <a:lnSpc>
+                  <a:spcPct val="100000"/>
+                </a:lnSpc>
+                <a:spcBef>
+                  <a:spcPct val="0"/>
+                </a:spcBef>
+                <a:spcAft>
+                  <a:spcPct val="0"/>
+                </a:spcAft>
+                <a:buClrTx/>
+                <a:buSzTx/>
+                <a:buFontTx/>
+                <a:buNone/>
+                <a:tabLst/>
+              </a:pPr>
+              <a:endParaRPr kumimoji="0" lang="en-US" sz="1800" b="0" i="0" u="none" strike="noStrike" cap="none" normalizeH="0" baseline="0" smtClean="0">
                 <a:ln>
                   <a:noFill/>
                 </a:ln>
@@ -4212,11 +4519,91 @@
                 </a:solidFill>
                 <a:effectLst/>
                 <a:latin typeface="Arial" charset="0"/>
-              </a:rPr>
-              <a:t>SPO</a:t>
-            </a:r>
-            <a:r>
-              <a:rPr kumimoji="0" lang="en-US" sz="1200" b="0" i="0" u="none" strike="noStrike" cap="none" normalizeH="0" baseline="-25000" dirty="0" smtClean="0">
+              </a:endParaRPr>
+            </a:p>
+          </p:txBody>
+        </p:sp>
+        <p:sp>
+          <p:nvSpPr>
+            <p:cNvPr id="80" name="TextBox 79"/>
+            <p:cNvSpPr txBox="1"/>
+            <p:nvPr/>
+          </p:nvSpPr>
+          <p:spPr>
+            <a:xfrm>
+              <a:off x="2185086" y="2395151"/>
+              <a:ext cx="925429" cy="400110"/>
+            </a:xfrm>
+            <a:prstGeom prst="rect">
+              <a:avLst/>
+            </a:prstGeom>
+            <a:noFill/>
+          </p:spPr>
+          <p:txBody>
+            <a:bodyPr wrap="none" rtlCol="0">
+              <a:spAutoFit/>
+            </a:bodyPr>
+            <a:lstStyle/>
+            <a:p>
+              <a:r>
+                <a:rPr lang="en-US" sz="2000" dirty="0" smtClean="0"/>
+                <a:t>MDCF</a:t>
+              </a:r>
+              <a:endParaRPr lang="en-US" sz="2000" dirty="0"/>
+            </a:p>
+          </p:txBody>
+        </p:sp>
+        <p:sp>
+          <p:nvSpPr>
+            <p:cNvPr id="81" name="Rectangle 80"/>
+            <p:cNvSpPr/>
+            <p:nvPr/>
+          </p:nvSpPr>
+          <p:spPr bwMode="auto">
+            <a:xfrm>
+              <a:off x="2895600" y="3124200"/>
+              <a:ext cx="1676400" cy="1219200"/>
+            </a:xfrm>
+            <a:prstGeom prst="rect">
+              <a:avLst/>
+            </a:prstGeom>
+            <a:noFill/>
+            <a:ln w="9525" cap="flat" cmpd="sng" algn="ctr">
+              <a:solidFill>
+                <a:schemeClr val="tx1"/>
+              </a:solidFill>
+              <a:prstDash val="solid"/>
+              <a:round/>
+              <a:headEnd type="none" w="med" len="med"/>
+              <a:tailEnd type="none" w="med" len="med"/>
+            </a:ln>
+            <a:effectLst/>
+          </p:spPr>
+          <p:txBody>
+            <a:bodyPr vert="horz" wrap="square" lIns="91440" tIns="45720" rIns="91440" bIns="45720" numCol="1" rtlCol="0" anchor="t" anchorCtr="0" compatLnSpc="1">
+              <a:prstTxWarp prst="textNoShape">
+                <a:avLst/>
+              </a:prstTxWarp>
+            </a:bodyPr>
+            <a:lstStyle/>
+            <a:p>
+              <a:pPr marL="0" marR="0" indent="0" algn="l" defTabSz="914400" rtl="0" eaLnBrk="1" fontAlgn="base" latinLnBrk="0" hangingPunct="1">
+                <a:lnSpc>
+                  <a:spcPct val="100000"/>
+                </a:lnSpc>
+                <a:spcBef>
+                  <a:spcPct val="0"/>
+                </a:spcBef>
+                <a:spcAft>
+                  <a:spcPct val="0"/>
+                </a:spcAft>
+                <a:buClrTx/>
+                <a:buSzTx/>
+                <a:buFontTx/>
+                <a:buNone/>
+                <a:tabLst/>
+              </a:pPr>
+              <a:endParaRPr kumimoji="0" lang="en-US" sz="1800" b="0" i="0" u="none" strike="noStrike" cap="none" normalizeH="0" baseline="0" smtClean="0">
                 <a:ln>
                   <a:noFill/>
                 </a:ln>
@@ -4225,57 +4612,628 @@
                 </a:solidFill>
                 <a:effectLst/>
                 <a:latin typeface="Arial" charset="0"/>
-              </a:rPr>
-              <a:t>2</a:t>
-            </a:r>
-          </a:p>
-        </p:txBody>
-      </p:sp>
-      <p:sp>
-        <p:nvSpPr>
-          <p:cNvPr id="78" name="Rectangle 16"/>
-          <p:cNvSpPr>
-            <a:spLocks noChangeArrowheads="1"/>
-          </p:cNvSpPr>
-          <p:nvPr/>
-        </p:nvSpPr>
-        <p:spPr bwMode="auto">
-          <a:xfrm rot="16200000">
-            <a:off x="3619500" y="4000500"/>
-            <a:ext cx="5029200" cy="381000"/>
-          </a:xfrm>
-          <a:prstGeom prst="rect">
-            <a:avLst/>
-          </a:prstGeom>
-          <a:solidFill>
-            <a:srgbClr val="A0D474">
-              <a:alpha val="63000"/>
-            </a:srgbClr>
-          </a:solidFill>
-          <a:ln w="9525">
+              </a:endParaRPr>
+            </a:p>
+          </p:txBody>
+        </p:sp>
+        <p:sp>
+          <p:nvSpPr>
+            <p:cNvPr id="82" name="TextBox 81"/>
+            <p:cNvSpPr txBox="1"/>
+            <p:nvPr/>
+          </p:nvSpPr>
+          <p:spPr>
+            <a:xfrm>
+              <a:off x="4038600" y="2827637"/>
+              <a:ext cx="653845" cy="400110"/>
+            </a:xfrm>
+            <a:prstGeom prst="rect">
+              <a:avLst/>
+            </a:prstGeom>
+            <a:noFill/>
+          </p:spPr>
+          <p:txBody>
+            <a:bodyPr wrap="none" rtlCol="0">
+              <a:spAutoFit/>
+            </a:bodyPr>
+            <a:lstStyle/>
+            <a:p>
+              <a:r>
+                <a:rPr lang="en-US" sz="2000" dirty="0" smtClean="0"/>
+                <a:t>App</a:t>
+              </a:r>
+              <a:endParaRPr lang="en-US" sz="2000" dirty="0"/>
+            </a:p>
+          </p:txBody>
+        </p:sp>
+        <p:cxnSp>
+          <p:nvCxnSpPr>
+            <p:cNvPr id="84" name="Straight Arrow Connector 83"/>
+            <p:cNvCxnSpPr/>
+            <p:nvPr/>
+          </p:nvCxnSpPr>
+          <p:spPr bwMode="auto">
+            <a:xfrm>
+              <a:off x="4267200" y="2209800"/>
+              <a:ext cx="0" cy="457200"/>
+            </a:xfrm>
+            <a:prstGeom prst="straightConnector1">
+              <a:avLst/>
+            </a:prstGeom>
+            <a:noFill/>
+            <a:ln w="9525" cap="flat" cmpd="sng" algn="ctr">
+              <a:solidFill>
+                <a:srgbClr val="3366FF"/>
+              </a:solidFill>
+              <a:prstDash val="solid"/>
+              <a:round/>
+              <a:headEnd type="triangle" w="med" len="med"/>
+              <a:tailEnd type="none" w="med" len="med"/>
+            </a:ln>
+            <a:effectLst/>
+          </p:spPr>
+        </p:cxnSp>
+        <p:sp>
+          <p:nvSpPr>
+            <p:cNvPr id="86" name="Rectangle 85"/>
+            <p:cNvSpPr/>
+            <p:nvPr/>
+          </p:nvSpPr>
+          <p:spPr bwMode="auto">
+            <a:xfrm>
+              <a:off x="3276600" y="1676400"/>
+              <a:ext cx="1295400" cy="533400"/>
+            </a:xfrm>
+            <a:prstGeom prst="rect">
+              <a:avLst/>
+            </a:prstGeom>
+            <a:noFill/>
+            <a:ln w="9525" cap="flat" cmpd="sng" algn="ctr">
+              <a:solidFill>
+                <a:schemeClr val="tx1"/>
+              </a:solidFill>
+              <a:prstDash val="dash"/>
+              <a:round/>
+              <a:headEnd type="none" w="med" len="med"/>
+              <a:tailEnd type="none" w="med" len="med"/>
+            </a:ln>
+            <a:effectLst/>
+          </p:spPr>
+          <p:txBody>
+            <a:bodyPr vert="horz" wrap="square" lIns="91440" tIns="45720" rIns="91440" bIns="45720" numCol="1" rtlCol="0" anchor="t" anchorCtr="0" compatLnSpc="1">
+              <a:prstTxWarp prst="textNoShape">
+                <a:avLst/>
+              </a:prstTxWarp>
+            </a:bodyPr>
+            <a:lstStyle/>
+            <a:p>
+              <a:pPr marL="0" marR="0" indent="0" algn="l" defTabSz="914400" rtl="0" eaLnBrk="1" fontAlgn="base" latinLnBrk="0" hangingPunct="1">
+                <a:lnSpc>
+                  <a:spcPct val="100000"/>
+                </a:lnSpc>
+                <a:spcBef>
+                  <a:spcPct val="0"/>
+                </a:spcBef>
+                <a:spcAft>
+                  <a:spcPct val="0"/>
+                </a:spcAft>
+                <a:buClrTx/>
+                <a:buSzTx/>
+                <a:buFontTx/>
+                <a:buNone/>
+                <a:tabLst/>
+              </a:pPr>
+              <a:endParaRPr kumimoji="0" lang="en-US" sz="1800" b="0" i="0" u="none" strike="noStrike" cap="none" normalizeH="0" baseline="0" smtClean="0">
+                <a:ln>
+                  <a:noFill/>
+                </a:ln>
+                <a:solidFill>
+                  <a:schemeClr val="tx1"/>
+                </a:solidFill>
+                <a:effectLst/>
+                <a:latin typeface="Arial" charset="0"/>
+              </a:endParaRPr>
+            </a:p>
+          </p:txBody>
+        </p:sp>
+        <p:sp>
+          <p:nvSpPr>
+            <p:cNvPr id="87" name="TextBox 86"/>
+            <p:cNvSpPr txBox="1"/>
+            <p:nvPr/>
+          </p:nvSpPr>
+          <p:spPr>
+            <a:xfrm>
+              <a:off x="3235411" y="1468394"/>
+              <a:ext cx="1018628" cy="276999"/>
+            </a:xfrm>
+            <a:prstGeom prst="rect">
+              <a:avLst/>
+            </a:prstGeom>
+            <a:noFill/>
+          </p:spPr>
+          <p:txBody>
+            <a:bodyPr wrap="none" rtlCol="0">
+              <a:spAutoFit/>
+            </a:bodyPr>
+            <a:lstStyle/>
+            <a:p>
+              <a:r>
+                <a:rPr lang="en-US" sz="1200" dirty="0" smtClean="0"/>
+                <a:t>App </a:t>
+              </a:r>
+              <a:r>
+                <a:rPr lang="en-US" sz="1200" dirty="0" smtClean="0"/>
+                <a:t>Display</a:t>
+              </a:r>
+              <a:endParaRPr lang="en-US" sz="1200" dirty="0"/>
+            </a:p>
+          </p:txBody>
+        </p:sp>
+        <p:cxnSp>
+          <p:nvCxnSpPr>
+            <p:cNvPr id="91" name="Straight Connector 90"/>
+            <p:cNvCxnSpPr/>
+            <p:nvPr/>
+          </p:nvCxnSpPr>
+          <p:spPr bwMode="auto">
+            <a:xfrm>
+              <a:off x="4572000" y="1982788"/>
+              <a:ext cx="1371600" cy="0"/>
+            </a:xfrm>
+            <a:prstGeom prst="line">
+              <a:avLst/>
+            </a:prstGeom>
+            <a:noFill/>
+            <a:ln w="9525" cap="flat" cmpd="sng" algn="ctr">
+              <a:solidFill>
+                <a:srgbClr val="A0D474"/>
+              </a:solidFill>
+              <a:prstDash val="solid"/>
+              <a:round/>
+              <a:headEnd type="none" w="med" len="med"/>
+              <a:tailEnd type="triangle" w="med" len="med"/>
+            </a:ln>
+            <a:effectLst/>
+          </p:spPr>
+        </p:cxnSp>
+        <p:sp>
+          <p:nvSpPr>
+            <p:cNvPr id="93" name="Text Box 23"/>
+            <p:cNvSpPr txBox="1">
+              <a:spLocks noChangeArrowheads="1"/>
+            </p:cNvSpPr>
+            <p:nvPr/>
+          </p:nvSpPr>
+          <p:spPr bwMode="auto">
+            <a:xfrm>
+              <a:off x="4780005" y="1777314"/>
+              <a:ext cx="990600" cy="261610"/>
+            </a:xfrm>
+            <a:prstGeom prst="rect">
+              <a:avLst/>
+            </a:prstGeom>
+            <a:noFill/>
+            <a:ln w="9525">
+              <a:noFill/>
+              <a:miter lim="800000"/>
+              <a:headEnd/>
+              <a:tailEnd/>
+            </a:ln>
+            <a:effectLst/>
+          </p:spPr>
+          <p:txBody>
+            <a:bodyPr wrap="square">
+              <a:spAutoFit/>
+            </a:bodyPr>
+            <a:lstStyle/>
+            <a:p>
+              <a:pPr>
+                <a:spcBef>
+                  <a:spcPct val="50000"/>
+                </a:spcBef>
+              </a:pPr>
+              <a:r>
+                <a:rPr lang="en-US" sz="1100" dirty="0" smtClean="0"/>
+                <a:t>View Display</a:t>
+              </a:r>
+            </a:p>
+          </p:txBody>
+        </p:sp>
+        <p:cxnSp>
+          <p:nvCxnSpPr>
+            <p:cNvPr id="94" name="Straight Connector 93"/>
+            <p:cNvCxnSpPr/>
+            <p:nvPr/>
+          </p:nvCxnSpPr>
+          <p:spPr bwMode="auto">
+            <a:xfrm flipH="1">
+              <a:off x="3581400" y="5716588"/>
+              <a:ext cx="2362200" cy="0"/>
+            </a:xfrm>
+            <a:prstGeom prst="line">
+              <a:avLst/>
+            </a:prstGeom>
+            <a:noFill/>
+            <a:ln w="9525" cap="flat" cmpd="sng" algn="ctr">
+              <a:solidFill>
+                <a:srgbClr val="A0D474"/>
+              </a:solidFill>
+              <a:prstDash val="solid"/>
+              <a:round/>
+              <a:headEnd type="none" w="med" len="med"/>
+              <a:tailEnd type="triangle" w="med" len="med"/>
+            </a:ln>
+            <a:effectLst/>
+          </p:spPr>
+        </p:cxnSp>
+        <p:cxnSp>
+          <p:nvCxnSpPr>
+            <p:cNvPr id="95" name="Straight Connector 94"/>
+            <p:cNvCxnSpPr/>
+            <p:nvPr/>
+          </p:nvCxnSpPr>
+          <p:spPr bwMode="auto">
+            <a:xfrm>
+              <a:off x="3581400" y="5564188"/>
+              <a:ext cx="2362200" cy="0"/>
+            </a:xfrm>
+            <a:prstGeom prst="line">
+              <a:avLst/>
+            </a:prstGeom>
+            <a:noFill/>
+            <a:ln w="9525" cap="flat" cmpd="sng" algn="ctr">
+              <a:solidFill>
+                <a:srgbClr val="A0D474"/>
+              </a:solidFill>
+              <a:prstDash val="solid"/>
+              <a:round/>
+              <a:headEnd type="none" w="med" len="med"/>
+              <a:tailEnd type="triangle" w="med" len="med"/>
+            </a:ln>
+            <a:effectLst/>
+          </p:spPr>
+        </p:cxnSp>
+        <p:sp>
+          <p:nvSpPr>
+            <p:cNvPr id="96" name="Text Box 23"/>
+            <p:cNvSpPr txBox="1">
+              <a:spLocks noChangeArrowheads="1"/>
+            </p:cNvSpPr>
+            <p:nvPr/>
+          </p:nvSpPr>
+          <p:spPr bwMode="auto">
+            <a:xfrm>
+              <a:off x="4038600" y="5669691"/>
+              <a:ext cx="1668162" cy="212116"/>
+            </a:xfrm>
+            <a:prstGeom prst="rect">
+              <a:avLst/>
+            </a:prstGeom>
+            <a:noFill/>
+            <a:ln w="9525">
+              <a:noFill/>
+              <a:miter lim="800000"/>
+              <a:headEnd/>
+              <a:tailEnd/>
+            </a:ln>
+            <a:effectLst/>
+          </p:spPr>
+          <p:txBody>
+            <a:bodyPr wrap="square">
+              <a:spAutoFit/>
+            </a:bodyPr>
+            <a:lstStyle/>
+            <a:p>
+              <a:pPr>
+                <a:spcBef>
+                  <a:spcPct val="50000"/>
+                </a:spcBef>
+              </a:pPr>
+              <a:r>
+                <a:rPr lang="en-US" sz="1100" dirty="0" smtClean="0"/>
+                <a:t>Configuration, Alarm Clear</a:t>
+              </a:r>
+            </a:p>
+          </p:txBody>
+        </p:sp>
+        <p:sp>
+          <p:nvSpPr>
+            <p:cNvPr id="97" name="Text Box 23"/>
+            <p:cNvSpPr txBox="1">
+              <a:spLocks noChangeArrowheads="1"/>
+            </p:cNvSpPr>
+            <p:nvPr/>
+          </p:nvSpPr>
+          <p:spPr bwMode="auto">
+            <a:xfrm>
+              <a:off x="4285735" y="5360772"/>
+              <a:ext cx="990600" cy="261610"/>
+            </a:xfrm>
+            <a:prstGeom prst="rect">
+              <a:avLst/>
+            </a:prstGeom>
+            <a:noFill/>
+            <a:ln w="9525">
+              <a:noFill/>
+              <a:miter lim="800000"/>
+              <a:headEnd/>
+              <a:tailEnd/>
+            </a:ln>
+            <a:effectLst/>
+          </p:spPr>
+          <p:txBody>
+            <a:bodyPr wrap="square">
+              <a:spAutoFit/>
+            </a:bodyPr>
+            <a:lstStyle/>
+            <a:p>
+              <a:pPr>
+                <a:spcBef>
+                  <a:spcPct val="50000"/>
+                </a:spcBef>
+              </a:pPr>
+              <a:r>
+                <a:rPr lang="en-US" sz="1100" dirty="0" smtClean="0"/>
+                <a:t>View Display</a:t>
+              </a:r>
+            </a:p>
+          </p:txBody>
+        </p:sp>
+        <p:cxnSp>
+          <p:nvCxnSpPr>
+            <p:cNvPr id="111" name="Straight Connector 110"/>
+            <p:cNvCxnSpPr/>
+            <p:nvPr/>
+          </p:nvCxnSpPr>
+          <p:spPr bwMode="auto">
+            <a:xfrm flipH="1">
+              <a:off x="4419600" y="6553200"/>
+              <a:ext cx="1524000" cy="0"/>
+            </a:xfrm>
+            <a:prstGeom prst="line">
+              <a:avLst/>
+            </a:prstGeom>
+            <a:noFill/>
+            <a:ln w="9525" cap="flat" cmpd="sng" algn="ctr">
+              <a:solidFill>
+                <a:srgbClr val="A0D474"/>
+              </a:solidFill>
+              <a:prstDash val="solid"/>
+              <a:round/>
+              <a:headEnd type="none" w="med" len="med"/>
+              <a:tailEnd type="triangle" w="med" len="med"/>
+            </a:ln>
+            <a:effectLst/>
+          </p:spPr>
+        </p:cxnSp>
+        <p:sp>
+          <p:nvSpPr>
+            <p:cNvPr id="113" name="Text Box 23"/>
+            <p:cNvSpPr txBox="1">
+              <a:spLocks noChangeArrowheads="1"/>
+            </p:cNvSpPr>
+            <p:nvPr/>
+          </p:nvSpPr>
+          <p:spPr bwMode="auto">
+            <a:xfrm>
+              <a:off x="4656438" y="6349313"/>
+              <a:ext cx="1260764" cy="261610"/>
+            </a:xfrm>
+            <a:prstGeom prst="rect">
+              <a:avLst/>
+            </a:prstGeom>
+            <a:noFill/>
+            <a:ln w="9525">
+              <a:noFill/>
+              <a:miter lim="800000"/>
+              <a:headEnd/>
+              <a:tailEnd/>
+            </a:ln>
+            <a:effectLst/>
+          </p:spPr>
+          <p:txBody>
+            <a:bodyPr wrap="square">
+              <a:spAutoFit/>
+            </a:bodyPr>
+            <a:lstStyle/>
+            <a:p>
+              <a:pPr>
+                <a:spcBef>
+                  <a:spcPct val="50000"/>
+                </a:spcBef>
+              </a:pPr>
+              <a:r>
+                <a:rPr lang="en-US" sz="1100" dirty="0" smtClean="0"/>
+                <a:t>Attach Sensors</a:t>
+              </a:r>
+            </a:p>
+          </p:txBody>
+        </p:sp>
+        <p:sp>
+          <p:nvSpPr>
+            <p:cNvPr id="50" name="Rectangle 49"/>
+            <p:cNvSpPr/>
+            <p:nvPr/>
+          </p:nvSpPr>
+          <p:spPr bwMode="auto">
+            <a:xfrm>
+              <a:off x="2895600" y="5486400"/>
+              <a:ext cx="685800" cy="685800"/>
+            </a:xfrm>
+            <a:prstGeom prst="rect">
+              <a:avLst/>
+            </a:prstGeom>
             <a:solidFill>
-              <a:schemeClr val="tx1"/>
+              <a:srgbClr val="00FDFE"/>
             </a:solidFill>
-            <a:miter lim="800000"/>
-            <a:headEnd/>
-            <a:tailEnd/>
-          </a:ln>
-          <a:effectLst/>
-        </p:spPr>
-        <p:txBody>
-          <a:bodyPr wrap="none" anchor="ctr"/>
-          <a:lstStyle/>
-          <a:p>
-            <a:pPr algn="ctr"/>
-            <a:r>
-              <a:rPr lang="en-US" dirty="0" smtClean="0"/>
-              <a:t>Clinician (App Administrator)</a:t>
-            </a:r>
-            <a:endParaRPr lang="en-US" dirty="0"/>
-          </a:p>
-        </p:txBody>
-      </p:sp>
+            <a:ln w="12700" cap="flat" cmpd="sng" algn="ctr">
+              <a:solidFill>
+                <a:schemeClr val="tx1"/>
+              </a:solidFill>
+              <a:prstDash val="solid"/>
+              <a:round/>
+              <a:headEnd type="none" w="med" len="med"/>
+              <a:tailEnd type="none" w="med" len="med"/>
+            </a:ln>
+            <a:effectLst/>
+          </p:spPr>
+          <p:txBody>
+            <a:bodyPr vert="horz" wrap="square" lIns="91440" tIns="45720" rIns="91440" bIns="45720" numCol="1" rtlCol="0" anchor="ctr" anchorCtr="0" compatLnSpc="1">
+              <a:prstTxWarp prst="textNoShape">
+                <a:avLst/>
+              </a:prstTxWarp>
+            </a:bodyPr>
+            <a:lstStyle/>
+            <a:p>
+              <a:pPr marL="0" marR="0" indent="0" algn="ctr" defTabSz="914400" rtl="0" eaLnBrk="1" fontAlgn="base" latinLnBrk="0" hangingPunct="1">
+                <a:lnSpc>
+                  <a:spcPct val="100000"/>
+                </a:lnSpc>
+                <a:spcBef>
+                  <a:spcPct val="0"/>
+                </a:spcBef>
+                <a:spcAft>
+                  <a:spcPct val="0"/>
+                </a:spcAft>
+                <a:buClrTx/>
+                <a:buSzTx/>
+                <a:buFontTx/>
+                <a:buNone/>
+                <a:tabLst/>
+              </a:pPr>
+              <a:r>
+                <a:rPr kumimoji="0" lang="en-US" sz="1400" b="0" i="0" u="none" strike="noStrike" cap="none" normalizeH="0" baseline="0" dirty="0" smtClean="0">
+                  <a:ln>
+                    <a:noFill/>
+                  </a:ln>
+                  <a:solidFill>
+                    <a:schemeClr val="tx1"/>
+                  </a:solidFill>
+                  <a:effectLst/>
+                  <a:latin typeface="Arial" charset="0"/>
+                </a:rPr>
+                <a:t>SPO</a:t>
+              </a:r>
+              <a:r>
+                <a:rPr kumimoji="0" lang="en-US" sz="1400" b="0" i="0" u="none" strike="noStrike" cap="none" normalizeH="0" baseline="-25000" dirty="0" smtClean="0">
+                  <a:ln>
+                    <a:noFill/>
+                  </a:ln>
+                  <a:solidFill>
+                    <a:schemeClr val="tx1"/>
+                  </a:solidFill>
+                  <a:effectLst/>
+                  <a:latin typeface="Arial" charset="0"/>
+                </a:rPr>
+                <a:t>2</a:t>
+              </a:r>
+            </a:p>
+          </p:txBody>
+        </p:sp>
+        <p:sp>
+          <p:nvSpPr>
+            <p:cNvPr id="78" name="Rectangle 16"/>
+            <p:cNvSpPr>
+              <a:spLocks noChangeArrowheads="1"/>
+            </p:cNvSpPr>
+            <p:nvPr/>
+          </p:nvSpPr>
+          <p:spPr bwMode="auto">
+            <a:xfrm rot="16200000">
+              <a:off x="3619500" y="4000500"/>
+              <a:ext cx="5029200" cy="381000"/>
+            </a:xfrm>
+            <a:prstGeom prst="rect">
+              <a:avLst/>
+            </a:prstGeom>
+            <a:solidFill>
+              <a:srgbClr val="A0D474">
+                <a:alpha val="63000"/>
+              </a:srgbClr>
+            </a:solidFill>
+            <a:ln w="9525">
+              <a:solidFill>
+                <a:schemeClr val="tx1"/>
+              </a:solidFill>
+              <a:miter lim="800000"/>
+              <a:headEnd/>
+              <a:tailEnd/>
+            </a:ln>
+            <a:effectLst/>
+          </p:spPr>
+          <p:txBody>
+            <a:bodyPr wrap="none" anchor="ctr"/>
+            <a:lstStyle/>
+            <a:p>
+              <a:pPr algn="ctr"/>
+              <a:r>
+                <a:rPr lang="en-US" dirty="0" smtClean="0"/>
+                <a:t>Clinician (App Administrator)</a:t>
+              </a:r>
+              <a:endParaRPr lang="en-US" dirty="0"/>
+            </a:p>
+          </p:txBody>
+        </p:sp>
+        <p:sp>
+          <p:nvSpPr>
+            <p:cNvPr id="28" name="Text Box 23"/>
+            <p:cNvSpPr txBox="1">
+              <a:spLocks noChangeArrowheads="1"/>
+            </p:cNvSpPr>
+            <p:nvPr/>
+          </p:nvSpPr>
+          <p:spPr bwMode="auto">
+            <a:xfrm>
+              <a:off x="4223951" y="2271584"/>
+              <a:ext cx="1359243" cy="349368"/>
+            </a:xfrm>
+            <a:prstGeom prst="rect">
+              <a:avLst/>
+            </a:prstGeom>
+            <a:noFill/>
+            <a:ln w="9525">
+              <a:noFill/>
+              <a:miter lim="800000"/>
+              <a:headEnd/>
+              <a:tailEnd/>
+            </a:ln>
+            <a:effectLst/>
+          </p:spPr>
+          <p:txBody>
+            <a:bodyPr wrap="square">
+              <a:spAutoFit/>
+            </a:bodyPr>
+            <a:lstStyle/>
+            <a:p>
+              <a:pPr>
+                <a:spcBef>
+                  <a:spcPct val="50000"/>
+                </a:spcBef>
+              </a:pPr>
+              <a:r>
+                <a:rPr lang="en-US" sz="1100" i="1" dirty="0" smtClean="0">
+                  <a:solidFill>
+                    <a:srgbClr val="FF0000"/>
+                  </a:solidFill>
+                </a:rPr>
+                <a:t>Incorrect Physiological Values</a:t>
+              </a:r>
+              <a:endParaRPr lang="en-US" sz="1100" i="1" dirty="0" smtClean="0">
+                <a:solidFill>
+                  <a:srgbClr val="FF0000"/>
+                </a:solidFill>
+              </a:endParaRPr>
+            </a:p>
+          </p:txBody>
+        </p:sp>
+      </p:grpSp>
     </p:spTree>
+    <p:extLst>
+      <p:ext uri="{BB962C8B-B14F-4D97-AF65-F5344CB8AC3E}">
+        <p14:creationId xmlns:p14="http://schemas.microsoft.com/office/powerpoint/2010/main" val="2611425035"/>
+      </p:ext>
+    </p:extLst>
   </p:cSld>
   <p:clrMapOvr>
     <a:masterClrMapping/>

</xml_diff>